<commit_message>
Modify header in templates (include banner indicating out-of-box performance, move text up slightly). Correct some issues with ozone template (reference -> FRM/FEM, specify hourly concentration target of 60 ppbv)
</commit_message>
<xml_diff>
--- a/Reports/templates/O3/Reporting_Template_Base_O3.pptx
+++ b/Reports/templates/O3/Reporting_Template_Base_O3.pptx
@@ -141,6 +141,338 @@
 
 <file path=ppt/changesInfos/changesInfo1.xml><?xml version="1.0" encoding="utf-8"?>
 <pc:chgInfo xmlns:a="http://schemas.openxmlformats.org/drawingml/2006/main" xmlns:r="http://schemas.openxmlformats.org/officeDocument/2006/relationships" xmlns:ac="http://schemas.microsoft.com/office/drawing/2013/main/command" xmlns:pc="http://schemas.microsoft.com/office/powerpoint/2013/main/command">
+  <pc:docChgLst>
+    <pc:chgData name="Frederick, Samuel" userId="090dec4f-7d84-4616-bef6-b2226d1b24c4" providerId="ADAL" clId="{360A67A5-37B6-4E00-A191-96F89693057C}"/>
+    <pc:docChg chg="undo redo custSel modSld modMainMaster">
+      <pc:chgData name="Frederick, Samuel" userId="090dec4f-7d84-4616-bef6-b2226d1b24c4" providerId="ADAL" clId="{360A67A5-37B6-4E00-A191-96F89693057C}" dt="2021-06-25T17:48:28.005" v="167" actId="478"/>
+      <pc:docMkLst>
+        <pc:docMk/>
+      </pc:docMkLst>
+      <pc:sldChg chg="addSp delSp modSp mod">
+        <pc:chgData name="Frederick, Samuel" userId="090dec4f-7d84-4616-bef6-b2226d1b24c4" providerId="ADAL" clId="{360A67A5-37B6-4E00-A191-96F89693057C}" dt="2021-06-25T17:48:28.005" v="167" actId="478"/>
+        <pc:sldMkLst>
+          <pc:docMk/>
+          <pc:sldMk cId="1609848839" sldId="256"/>
+        </pc:sldMkLst>
+        <pc:spChg chg="del">
+          <ac:chgData name="Frederick, Samuel" userId="090dec4f-7d84-4616-bef6-b2226d1b24c4" providerId="ADAL" clId="{360A67A5-37B6-4E00-A191-96F89693057C}" dt="2021-06-25T17:35:06.925" v="4"/>
+          <ac:spMkLst>
+            <pc:docMk/>
+            <pc:sldMk cId="1609848839" sldId="256"/>
+            <ac:spMk id="2" creationId="{D3BBE3C6-F1E4-4D42-8855-1B38098D718D}"/>
+          </ac:spMkLst>
+        </pc:spChg>
+        <pc:spChg chg="add mod">
+          <ac:chgData name="Frederick, Samuel" userId="090dec4f-7d84-4616-bef6-b2226d1b24c4" providerId="ADAL" clId="{360A67A5-37B6-4E00-A191-96F89693057C}" dt="2021-06-25T17:35:06.925" v="4"/>
+          <ac:spMkLst>
+            <pc:docMk/>
+            <pc:sldMk cId="1609848839" sldId="256"/>
+            <ac:spMk id="3" creationId="{E496A7F8-43F8-4BAA-ACE7-4F2FD405C445}"/>
+          </ac:spMkLst>
+        </pc:spChg>
+        <pc:spChg chg="del">
+          <ac:chgData name="Frederick, Samuel" userId="090dec4f-7d84-4616-bef6-b2226d1b24c4" providerId="ADAL" clId="{360A67A5-37B6-4E00-A191-96F89693057C}" dt="2021-06-25T17:35:06.925" v="4"/>
+          <ac:spMkLst>
+            <pc:docMk/>
+            <pc:sldMk cId="1609848839" sldId="256"/>
+            <ac:spMk id="4" creationId="{C1F6EC70-09A5-49CF-8C1A-8D0EB117AC03}"/>
+          </ac:spMkLst>
+        </pc:spChg>
+        <pc:spChg chg="del">
+          <ac:chgData name="Frederick, Samuel" userId="090dec4f-7d84-4616-bef6-b2226d1b24c4" providerId="ADAL" clId="{360A67A5-37B6-4E00-A191-96F89693057C}" dt="2021-06-25T17:35:06.925" v="4"/>
+          <ac:spMkLst>
+            <pc:docMk/>
+            <pc:sldMk cId="1609848839" sldId="256"/>
+            <ac:spMk id="5" creationId="{59B1715C-505C-471D-AC7B-8D5512F1F59D}"/>
+          </ac:spMkLst>
+        </pc:spChg>
+        <pc:spChg chg="add mod">
+          <ac:chgData name="Frederick, Samuel" userId="090dec4f-7d84-4616-bef6-b2226d1b24c4" providerId="ADAL" clId="{360A67A5-37B6-4E00-A191-96F89693057C}" dt="2021-06-25T17:35:06.925" v="4"/>
+          <ac:spMkLst>
+            <pc:docMk/>
+            <pc:sldMk cId="1609848839" sldId="256"/>
+            <ac:spMk id="6" creationId="{A96546AC-36CF-4A51-A082-C4DB57591699}"/>
+          </ac:spMkLst>
+        </pc:spChg>
+        <pc:spChg chg="add mod">
+          <ac:chgData name="Frederick, Samuel" userId="090dec4f-7d84-4616-bef6-b2226d1b24c4" providerId="ADAL" clId="{360A67A5-37B6-4E00-A191-96F89693057C}" dt="2021-06-25T17:35:06.925" v="4"/>
+          <ac:spMkLst>
+            <pc:docMk/>
+            <pc:sldMk cId="1609848839" sldId="256"/>
+            <ac:spMk id="7" creationId="{1F867A50-C366-451C-B510-1358A8E03B8F}"/>
+          </ac:spMkLst>
+        </pc:spChg>
+        <pc:spChg chg="del mod">
+          <ac:chgData name="Frederick, Samuel" userId="090dec4f-7d84-4616-bef6-b2226d1b24c4" providerId="ADAL" clId="{360A67A5-37B6-4E00-A191-96F89693057C}" dt="2021-06-25T17:44:02.034" v="115" actId="478"/>
+          <ac:spMkLst>
+            <pc:docMk/>
+            <pc:sldMk cId="1609848839" sldId="256"/>
+            <ac:spMk id="24" creationId="{E049956A-403C-4054-B4D6-AB0C98529660}"/>
+          </ac:spMkLst>
+        </pc:spChg>
+        <pc:spChg chg="mod">
+          <ac:chgData name="Frederick, Samuel" userId="090dec4f-7d84-4616-bef6-b2226d1b24c4" providerId="ADAL" clId="{360A67A5-37B6-4E00-A191-96F89693057C}" dt="2021-06-25T17:45:51.105" v="143" actId="1076"/>
+          <ac:spMkLst>
+            <pc:docMk/>
+            <pc:sldMk cId="1609848839" sldId="256"/>
+            <ac:spMk id="31" creationId="{C2D3D90C-F994-4CC3-8652-BCA3D4370ADC}"/>
+          </ac:spMkLst>
+        </pc:spChg>
+        <pc:spChg chg="add mod">
+          <ac:chgData name="Frederick, Samuel" userId="090dec4f-7d84-4616-bef6-b2226d1b24c4" providerId="ADAL" clId="{360A67A5-37B6-4E00-A191-96F89693057C}" dt="2021-06-25T17:48:21.649" v="166" actId="1076"/>
+          <ac:spMkLst>
+            <pc:docMk/>
+            <pc:sldMk cId="1609848839" sldId="256"/>
+            <ac:spMk id="34" creationId="{7D655D40-6DF2-4B90-8D9E-8C2B333DA162}"/>
+          </ac:spMkLst>
+        </pc:spChg>
+        <pc:spChg chg="mod">
+          <ac:chgData name="Frederick, Samuel" userId="090dec4f-7d84-4616-bef6-b2226d1b24c4" providerId="ADAL" clId="{360A67A5-37B6-4E00-A191-96F89693057C}" dt="2021-06-25T17:46:59.305" v="146" actId="1076"/>
+          <ac:spMkLst>
+            <pc:docMk/>
+            <pc:sldMk cId="1609848839" sldId="256"/>
+            <ac:spMk id="52" creationId="{C9375A12-4150-4C9A-A5FF-3226CB9B6B71}"/>
+          </ac:spMkLst>
+        </pc:spChg>
+        <pc:graphicFrameChg chg="mod modGraphic">
+          <ac:chgData name="Frederick, Samuel" userId="090dec4f-7d84-4616-bef6-b2226d1b24c4" providerId="ADAL" clId="{360A67A5-37B6-4E00-A191-96F89693057C}" dt="2021-06-25T17:37:23.694" v="30" actId="20577"/>
+          <ac:graphicFrameMkLst>
+            <pc:docMk/>
+            <pc:sldMk cId="1609848839" sldId="256"/>
+            <ac:graphicFrameMk id="18" creationId="{47941790-F508-45B8-841D-BA5D6A7CA69F}"/>
+          </ac:graphicFrameMkLst>
+        </pc:graphicFrameChg>
+        <pc:graphicFrameChg chg="mod modGraphic">
+          <ac:chgData name="Frederick, Samuel" userId="090dec4f-7d84-4616-bef6-b2226d1b24c4" providerId="ADAL" clId="{360A67A5-37B6-4E00-A191-96F89693057C}" dt="2021-06-25T17:37:01.740" v="20"/>
+          <ac:graphicFrameMkLst>
+            <pc:docMk/>
+            <pc:sldMk cId="1609848839" sldId="256"/>
+            <ac:graphicFrameMk id="30" creationId="{21A58A00-867E-4586-9E12-B610E1FDCE28}"/>
+          </ac:graphicFrameMkLst>
+        </pc:graphicFrameChg>
+        <pc:graphicFrameChg chg="add mod modGraphic">
+          <ac:chgData name="Frederick, Samuel" userId="090dec4f-7d84-4616-bef6-b2226d1b24c4" providerId="ADAL" clId="{360A67A5-37B6-4E00-A191-96F89693057C}" dt="2021-06-25T17:45:13.595" v="141" actId="20577"/>
+          <ac:graphicFrameMkLst>
+            <pc:docMk/>
+            <pc:sldMk cId="1609848839" sldId="256"/>
+            <ac:graphicFrameMk id="32" creationId="{B8FDD0E3-4EC8-4FB4-AAC5-E9C047C9329F}"/>
+          </ac:graphicFrameMkLst>
+        </pc:graphicFrameChg>
+        <pc:graphicFrameChg chg="add mod">
+          <ac:chgData name="Frederick, Samuel" userId="090dec4f-7d84-4616-bef6-b2226d1b24c4" providerId="ADAL" clId="{360A67A5-37B6-4E00-A191-96F89693057C}" dt="2021-06-25T17:43:43.265" v="111"/>
+          <ac:graphicFrameMkLst>
+            <pc:docMk/>
+            <pc:sldMk cId="1609848839" sldId="256"/>
+            <ac:graphicFrameMk id="33" creationId="{FF6CC21A-1E4F-4F2B-8F5A-10BA08714989}"/>
+          </ac:graphicFrameMkLst>
+        </pc:graphicFrameChg>
+        <pc:graphicFrameChg chg="del mod">
+          <ac:chgData name="Frederick, Samuel" userId="090dec4f-7d84-4616-bef6-b2226d1b24c4" providerId="ADAL" clId="{360A67A5-37B6-4E00-A191-96F89693057C}" dt="2021-06-25T17:43:34.700" v="109" actId="478"/>
+          <ac:graphicFrameMkLst>
+            <pc:docMk/>
+            <pc:sldMk cId="1609848839" sldId="256"/>
+            <ac:graphicFrameMk id="45" creationId="{CF285BA3-2F77-44D6-A90D-FA09A3ABA0E1}"/>
+          </ac:graphicFrameMkLst>
+        </pc:graphicFrameChg>
+        <pc:graphicFrameChg chg="del">
+          <ac:chgData name="Frederick, Samuel" userId="090dec4f-7d84-4616-bef6-b2226d1b24c4" providerId="ADAL" clId="{360A67A5-37B6-4E00-A191-96F89693057C}" dt="2021-06-25T17:43:36.491" v="110" actId="478"/>
+          <ac:graphicFrameMkLst>
+            <pc:docMk/>
+            <pc:sldMk cId="1609848839" sldId="256"/>
+            <ac:graphicFrameMk id="48" creationId="{AEF6C188-35F2-47DE-9D82-969D34B1EECF}"/>
+          </ac:graphicFrameMkLst>
+        </pc:graphicFrameChg>
+        <pc:graphicFrameChg chg="mod">
+          <ac:chgData name="Frederick, Samuel" userId="090dec4f-7d84-4616-bef6-b2226d1b24c4" providerId="ADAL" clId="{360A67A5-37B6-4E00-A191-96F89693057C}" dt="2021-06-25T17:36:28.360" v="10"/>
+          <ac:graphicFrameMkLst>
+            <pc:docMk/>
+            <pc:sldMk cId="1609848839" sldId="256"/>
+            <ac:graphicFrameMk id="51" creationId="{38C03BB1-CCE2-4806-8CE1-DD9943BC99C5}"/>
+          </ac:graphicFrameMkLst>
+        </pc:graphicFrameChg>
+        <pc:graphicFrameChg chg="mod modGraphic">
+          <ac:chgData name="Frederick, Samuel" userId="090dec4f-7d84-4616-bef6-b2226d1b24c4" providerId="ADAL" clId="{360A67A5-37B6-4E00-A191-96F89693057C}" dt="2021-06-25T17:43:31.759" v="108" actId="20577"/>
+          <ac:graphicFrameMkLst>
+            <pc:docMk/>
+            <pc:sldMk cId="1609848839" sldId="256"/>
+            <ac:graphicFrameMk id="56" creationId="{957E01A2-5E7D-419F-9E4A-7EC900B83EF7}"/>
+          </ac:graphicFrameMkLst>
+        </pc:graphicFrameChg>
+        <pc:cxnChg chg="add del mod">
+          <ac:chgData name="Frederick, Samuel" userId="090dec4f-7d84-4616-bef6-b2226d1b24c4" providerId="ADAL" clId="{360A67A5-37B6-4E00-A191-96F89693057C}" dt="2021-06-25T17:48:28.005" v="167" actId="478"/>
+          <ac:cxnSpMkLst>
+            <pc:docMk/>
+            <pc:sldMk cId="1609848839" sldId="256"/>
+            <ac:cxnSpMk id="9" creationId="{26AAFB8C-FD3F-4C54-BEF5-72647006D2F7}"/>
+          </ac:cxnSpMkLst>
+        </pc:cxnChg>
+      </pc:sldChg>
+      <pc:sldChg chg="addSp delSp modSp mod">
+        <pc:chgData name="Frederick, Samuel" userId="090dec4f-7d84-4616-bef6-b2226d1b24c4" providerId="ADAL" clId="{360A67A5-37B6-4E00-A191-96F89693057C}" dt="2021-06-25T17:35:46.375" v="8"/>
+        <pc:sldMkLst>
+          <pc:docMk/>
+          <pc:sldMk cId="677627962" sldId="260"/>
+        </pc:sldMkLst>
+        <pc:spChg chg="mod">
+          <ac:chgData name="Frederick, Samuel" userId="090dec4f-7d84-4616-bef6-b2226d1b24c4" providerId="ADAL" clId="{360A67A5-37B6-4E00-A191-96F89693057C}" dt="2021-06-25T17:35:10.147" v="5"/>
+          <ac:spMkLst>
+            <pc:docMk/>
+            <pc:sldMk cId="677627962" sldId="260"/>
+            <ac:spMk id="2" creationId="{5D2552CA-E9B4-457D-8B68-179D7461EB2D}"/>
+          </ac:spMkLst>
+        </pc:spChg>
+        <pc:spChg chg="del">
+          <ac:chgData name="Frederick, Samuel" userId="090dec4f-7d84-4616-bef6-b2226d1b24c4" providerId="ADAL" clId="{360A67A5-37B6-4E00-A191-96F89693057C}" dt="2021-06-25T17:35:10.147" v="5"/>
+          <ac:spMkLst>
+            <pc:docMk/>
+            <pc:sldMk cId="677627962" sldId="260"/>
+            <ac:spMk id="3" creationId="{4BE0F3C0-76E9-4BB6-BD59-BD00B774211E}"/>
+          </ac:spMkLst>
+        </pc:spChg>
+        <pc:spChg chg="add mod">
+          <ac:chgData name="Frederick, Samuel" userId="090dec4f-7d84-4616-bef6-b2226d1b24c4" providerId="ADAL" clId="{360A67A5-37B6-4E00-A191-96F89693057C}" dt="2021-06-25T17:35:10.147" v="5"/>
+          <ac:spMkLst>
+            <pc:docMk/>
+            <pc:sldMk cId="677627962" sldId="260"/>
+            <ac:spMk id="4" creationId="{6692EA42-EB5D-4422-9089-993AB136B2A6}"/>
+          </ac:spMkLst>
+        </pc:spChg>
+        <pc:spChg chg="mod">
+          <ac:chgData name="Frederick, Samuel" userId="090dec4f-7d84-4616-bef6-b2226d1b24c4" providerId="ADAL" clId="{360A67A5-37B6-4E00-A191-96F89693057C}" dt="2021-06-25T17:35:36.805" v="6"/>
+          <ac:spMkLst>
+            <pc:docMk/>
+            <pc:sldMk cId="677627962" sldId="260"/>
+            <ac:spMk id="5" creationId="{CA368A03-BB5B-4890-85C6-EC0F1DF40864}"/>
+          </ac:spMkLst>
+        </pc:spChg>
+        <pc:spChg chg="del">
+          <ac:chgData name="Frederick, Samuel" userId="090dec4f-7d84-4616-bef6-b2226d1b24c4" providerId="ADAL" clId="{360A67A5-37B6-4E00-A191-96F89693057C}" dt="2021-06-25T17:35:10.147" v="5"/>
+          <ac:spMkLst>
+            <pc:docMk/>
+            <pc:sldMk cId="677627962" sldId="260"/>
+            <ac:spMk id="6" creationId="{1FAC7418-B39F-48F7-A3F0-03D3E3D9F453}"/>
+          </ac:spMkLst>
+        </pc:spChg>
+        <pc:spChg chg="del">
+          <ac:chgData name="Frederick, Samuel" userId="090dec4f-7d84-4616-bef6-b2226d1b24c4" providerId="ADAL" clId="{360A67A5-37B6-4E00-A191-96F89693057C}" dt="2021-06-25T17:35:10.147" v="5"/>
+          <ac:spMkLst>
+            <pc:docMk/>
+            <pc:sldMk cId="677627962" sldId="260"/>
+            <ac:spMk id="7" creationId="{368CB50A-0C49-471D-870B-C34E5F12DC10}"/>
+          </ac:spMkLst>
+        </pc:spChg>
+        <pc:spChg chg="add mod">
+          <ac:chgData name="Frederick, Samuel" userId="090dec4f-7d84-4616-bef6-b2226d1b24c4" providerId="ADAL" clId="{360A67A5-37B6-4E00-A191-96F89693057C}" dt="2021-06-25T17:35:10.147" v="5"/>
+          <ac:spMkLst>
+            <pc:docMk/>
+            <pc:sldMk cId="677627962" sldId="260"/>
+            <ac:spMk id="8" creationId="{64EE5381-67C9-4DEA-ACDB-E9F8D6D7F4BE}"/>
+          </ac:spMkLst>
+        </pc:spChg>
+        <pc:spChg chg="add mod">
+          <ac:chgData name="Frederick, Samuel" userId="090dec4f-7d84-4616-bef6-b2226d1b24c4" providerId="ADAL" clId="{360A67A5-37B6-4E00-A191-96F89693057C}" dt="2021-06-25T17:35:10.147" v="5"/>
+          <ac:spMkLst>
+            <pc:docMk/>
+            <pc:sldMk cId="677627962" sldId="260"/>
+            <ac:spMk id="9" creationId="{5A97FEA4-A915-4FBD-B17A-D47AA1C1C52F}"/>
+          </ac:spMkLst>
+        </pc:spChg>
+        <pc:graphicFrameChg chg="del">
+          <ac:chgData name="Frederick, Samuel" userId="090dec4f-7d84-4616-bef6-b2226d1b24c4" providerId="ADAL" clId="{360A67A5-37B6-4E00-A191-96F89693057C}" dt="2021-06-25T17:35:46.207" v="7" actId="478"/>
+          <ac:graphicFrameMkLst>
+            <pc:docMk/>
+            <pc:sldMk cId="677627962" sldId="260"/>
+            <ac:graphicFrameMk id="12" creationId="{D41C8C22-744A-414D-A6F3-9BDC3E39EEDF}"/>
+          </ac:graphicFrameMkLst>
+        </pc:graphicFrameChg>
+        <pc:graphicFrameChg chg="add mod">
+          <ac:chgData name="Frederick, Samuel" userId="090dec4f-7d84-4616-bef6-b2226d1b24c4" providerId="ADAL" clId="{360A67A5-37B6-4E00-A191-96F89693057C}" dt="2021-06-25T17:35:46.375" v="8"/>
+          <ac:graphicFrameMkLst>
+            <pc:docMk/>
+            <pc:sldMk cId="677627962" sldId="260"/>
+            <ac:graphicFrameMk id="15" creationId="{FBCA8259-4FB6-42FD-AB91-6E8235005AB8}"/>
+          </ac:graphicFrameMkLst>
+        </pc:graphicFrameChg>
+      </pc:sldChg>
+      <pc:sldMasterChg chg="modSldLayout">
+        <pc:chgData name="Frederick, Samuel" userId="090dec4f-7d84-4616-bef6-b2226d1b24c4" providerId="ADAL" clId="{360A67A5-37B6-4E00-A191-96F89693057C}" dt="2021-06-25T17:34:54.934" v="3"/>
+        <pc:sldMasterMkLst>
+          <pc:docMk/>
+          <pc:sldMasterMk cId="1191321755" sldId="2147483684"/>
+        </pc:sldMasterMkLst>
+        <pc:sldLayoutChg chg="addSp delSp modSp mod">
+          <pc:chgData name="Frederick, Samuel" userId="090dec4f-7d84-4616-bef6-b2226d1b24c4" providerId="ADAL" clId="{360A67A5-37B6-4E00-A191-96F89693057C}" dt="2021-06-25T17:34:54.934" v="3"/>
+          <pc:sldLayoutMkLst>
+            <pc:docMk/>
+            <pc:sldMasterMk cId="1191321755" sldId="2147483684"/>
+            <pc:sldLayoutMk cId="6746695" sldId="2147483685"/>
+          </pc:sldLayoutMkLst>
+          <pc:spChg chg="del">
+            <ac:chgData name="Frederick, Samuel" userId="090dec4f-7d84-4616-bef6-b2226d1b24c4" providerId="ADAL" clId="{360A67A5-37B6-4E00-A191-96F89693057C}" dt="2021-06-25T17:34:54.370" v="2" actId="478"/>
+            <ac:spMkLst>
+              <pc:docMk/>
+              <pc:sldMasterMk cId="1191321755" sldId="2147483684"/>
+              <pc:sldLayoutMk cId="6746695" sldId="2147483685"/>
+              <ac:spMk id="9" creationId="{7BC6E539-5244-48A9-9F4E-73EEB03CD7D7}"/>
+            </ac:spMkLst>
+          </pc:spChg>
+          <pc:spChg chg="add mod">
+            <ac:chgData name="Frederick, Samuel" userId="090dec4f-7d84-4616-bef6-b2226d1b24c4" providerId="ADAL" clId="{360A67A5-37B6-4E00-A191-96F89693057C}" dt="2021-06-25T17:34:54.934" v="3"/>
+            <ac:spMkLst>
+              <pc:docMk/>
+              <pc:sldMasterMk cId="1191321755" sldId="2147483684"/>
+              <pc:sldLayoutMk cId="6746695" sldId="2147483685"/>
+              <ac:spMk id="10" creationId="{EBDB2795-E29B-423B-8CC3-2858E3CB59B9}"/>
+            </ac:spMkLst>
+          </pc:spChg>
+          <pc:spChg chg="add mod">
+            <ac:chgData name="Frederick, Samuel" userId="090dec4f-7d84-4616-bef6-b2226d1b24c4" providerId="ADAL" clId="{360A67A5-37B6-4E00-A191-96F89693057C}" dt="2021-06-25T17:34:54.934" v="3"/>
+            <ac:spMkLst>
+              <pc:docMk/>
+              <pc:sldMasterMk cId="1191321755" sldId="2147483684"/>
+              <pc:sldLayoutMk cId="6746695" sldId="2147483685"/>
+              <ac:spMk id="11" creationId="{7BDC237D-E31E-45E6-81B6-ADE019B9D1D6}"/>
+            </ac:spMkLst>
+          </pc:spChg>
+        </pc:sldLayoutChg>
+        <pc:sldLayoutChg chg="addSp delSp modSp mod">
+          <pc:chgData name="Frederick, Samuel" userId="090dec4f-7d84-4616-bef6-b2226d1b24c4" providerId="ADAL" clId="{360A67A5-37B6-4E00-A191-96F89693057C}" dt="2021-06-25T17:34:49.697" v="1"/>
+          <pc:sldLayoutMkLst>
+            <pc:docMk/>
+            <pc:sldMasterMk cId="1191321755" sldId="2147483684"/>
+            <pc:sldLayoutMk cId="45040622" sldId="2147483686"/>
+          </pc:sldLayoutMkLst>
+          <pc:spChg chg="del">
+            <ac:chgData name="Frederick, Samuel" userId="090dec4f-7d84-4616-bef6-b2226d1b24c4" providerId="ADAL" clId="{360A67A5-37B6-4E00-A191-96F89693057C}" dt="2021-06-25T17:34:49.261" v="0" actId="478"/>
+            <ac:spMkLst>
+              <pc:docMk/>
+              <pc:sldMasterMk cId="1191321755" sldId="2147483684"/>
+              <pc:sldLayoutMk cId="45040622" sldId="2147483686"/>
+              <ac:spMk id="5" creationId="{89D820F8-FAAC-4D4B-A90B-C8060CD41F76}"/>
+            </ac:spMkLst>
+          </pc:spChg>
+          <pc:spChg chg="add mod">
+            <ac:chgData name="Frederick, Samuel" userId="090dec4f-7d84-4616-bef6-b2226d1b24c4" providerId="ADAL" clId="{360A67A5-37B6-4E00-A191-96F89693057C}" dt="2021-06-25T17:34:49.697" v="1"/>
+            <ac:spMkLst>
+              <pc:docMk/>
+              <pc:sldMasterMk cId="1191321755" sldId="2147483684"/>
+              <pc:sldLayoutMk cId="45040622" sldId="2147483686"/>
+              <ac:spMk id="10" creationId="{088473F9-9820-45EC-867C-E1BAE0A43123}"/>
+            </ac:spMkLst>
+          </pc:spChg>
+          <pc:spChg chg="add mod">
+            <ac:chgData name="Frederick, Samuel" userId="090dec4f-7d84-4616-bef6-b2226d1b24c4" providerId="ADAL" clId="{360A67A5-37B6-4E00-A191-96F89693057C}" dt="2021-06-25T17:34:49.697" v="1"/>
+            <ac:spMkLst>
+              <pc:docMk/>
+              <pc:sldMasterMk cId="1191321755" sldId="2147483684"/>
+              <pc:sldLayoutMk cId="45040622" sldId="2147483686"/>
+              <ac:spMk id="11" creationId="{DFF07735-5A9D-461E-B236-B2EA294841B6}"/>
+            </ac:spMkLst>
+          </pc:spChg>
+        </pc:sldLayoutChg>
+      </pc:sldMasterChg>
+    </pc:docChg>
+  </pc:docChgLst>
   <pc:docChgLst>
     <pc:chgData name="Frederick, Samuel" userId="090dec4f-7d84-4616-bef6-b2226d1b24c4" providerId="ADAL" clId="{6302083C-E1B3-44C3-B094-27D1E811BBB1}"/>
     <pc:docChg chg="undo custSel addSld delSld modSld modMainMaster">
@@ -1423,7 +1755,7 @@
           <a:p>
             <a:fld id="{3CA1DE52-DF04-4D3A-9C2F-16E440759AD9}" type="datetimeFigureOut">
               <a:rPr lang="en-US" smtClean="0"/>
-              <a:t>12/30/2020</a:t>
+              <a:t>6/25/2021</a:t>
             </a:fld>
             <a:endParaRPr lang="en-US"/>
           </a:p>
@@ -2025,10 +2357,10 @@
       </p:sp>
       <p:sp>
         <p:nvSpPr>
-          <p:cNvPr id="9" name="Text Placeholder 4">
+          <p:cNvPr id="10" name="Text Placeholder 4">
             <a:extLst>
               <a:ext uri="{FF2B5EF4-FFF2-40B4-BE49-F238E27FC236}">
-                <a16:creationId xmlns:a16="http://schemas.microsoft.com/office/drawing/2014/main" id="{7BC6E539-5244-48A9-9F4E-73EEB03CD7D7}"/>
+                <a16:creationId xmlns:a16="http://schemas.microsoft.com/office/drawing/2014/main" id="{EBDB2795-E29B-423B-8CC3-2858E3CB59B9}"/>
               </a:ext>
             </a:extLst>
           </p:cNvPr>
@@ -2041,8 +2373,8 @@
         </p:nvSpPr>
         <p:spPr>
           <a:xfrm>
-            <a:off x="594360" y="777240"/>
-            <a:ext cx="6263640" cy="1014984"/>
+            <a:off x="896112" y="466344"/>
+            <a:ext cx="6080760" cy="1170432"/>
           </a:xfrm>
           <a:prstGeom prst="rect">
             <a:avLst/>
@@ -2059,6 +2391,69 @@
           <a:p>
             <a:pPr lvl="0"/>
             <a:endParaRPr lang="en-US" dirty="0"/>
+          </a:p>
+        </p:txBody>
+      </p:sp>
+      <p:sp>
+        <p:nvSpPr>
+          <p:cNvPr id="11" name="Rectangle: Rounded Corners 10">
+            <a:extLst>
+              <a:ext uri="{FF2B5EF4-FFF2-40B4-BE49-F238E27FC236}">
+                <a16:creationId xmlns:a16="http://schemas.microsoft.com/office/drawing/2014/main" id="{7BDC237D-E31E-45E6-81B6-ADE019B9D1D6}"/>
+              </a:ext>
+            </a:extLst>
+          </p:cNvPr>
+          <p:cNvSpPr/>
+          <p:nvPr userDrawn="1"/>
+        </p:nvSpPr>
+        <p:spPr>
+          <a:xfrm>
+            <a:off x="924905" y="1748826"/>
+            <a:ext cx="5403333" cy="473876"/>
+          </a:xfrm>
+          <a:prstGeom prst="roundRect">
+            <a:avLst/>
+          </a:prstGeom>
+          <a:solidFill>
+            <a:srgbClr val="BA9ACA"/>
+          </a:solidFill>
+          <a:ln w="28575">
+            <a:solidFill>
+              <a:srgbClr val="DDCEEA"/>
+            </a:solidFill>
+          </a:ln>
+        </p:spPr>
+        <p:style>
+          <a:lnRef idx="2">
+            <a:schemeClr val="accent1">
+              <a:shade val="50000"/>
+            </a:schemeClr>
+          </a:lnRef>
+          <a:fillRef idx="1">
+            <a:schemeClr val="accent1"/>
+          </a:fillRef>
+          <a:effectRef idx="0">
+            <a:schemeClr val="accent1"/>
+          </a:effectRef>
+          <a:fontRef idx="minor">
+            <a:schemeClr val="lt1"/>
+          </a:fontRef>
+        </p:style>
+        <p:txBody>
+          <a:bodyPr rtlCol="0" anchor="ctr"/>
+          <a:lstStyle/>
+          <a:p>
+            <a:pPr algn="ctr"/>
+            <a:r>
+              <a:rPr lang="en-US" sz="2000" dirty="0">
+                <a:solidFill>
+                  <a:schemeClr val="bg1">
+                    <a:lumMod val="95000"/>
+                  </a:schemeClr>
+                </a:solidFill>
+              </a:rPr>
+              <a:t>This report reflects out-of-the-box performance</a:t>
+            </a:r>
           </a:p>
         </p:txBody>
       </p:sp>
@@ -2287,45 +2682,6 @@
       </p:sp>
       <p:sp>
         <p:nvSpPr>
-          <p:cNvPr id="5" name="Text Placeholder 4">
-            <a:extLst>
-              <a:ext uri="{FF2B5EF4-FFF2-40B4-BE49-F238E27FC236}">
-                <a16:creationId xmlns:a16="http://schemas.microsoft.com/office/drawing/2014/main" id="{89D820F8-FAAC-4D4B-A90B-C8060CD41F76}"/>
-              </a:ext>
-            </a:extLst>
-          </p:cNvPr>
-          <p:cNvSpPr>
-            <a:spLocks noGrp="1"/>
-          </p:cNvSpPr>
-          <p:nvPr>
-            <p:ph type="body" sz="quarter" idx="14"/>
-          </p:nvPr>
-        </p:nvSpPr>
-        <p:spPr>
-          <a:xfrm>
-            <a:off x="594360" y="777240"/>
-            <a:ext cx="6263640" cy="1014984"/>
-          </a:xfrm>
-          <a:prstGeom prst="rect">
-            <a:avLst/>
-          </a:prstGeom>
-        </p:spPr>
-        <p:txBody>
-          <a:bodyPr/>
-          <a:lstStyle>
-            <a:lvl1pPr marL="0" indent="0">
-              <a:buNone/>
-              <a:defRPr sz="3000"/>
-            </a:lvl1pPr>
-          </a:lstStyle>
-          <a:p>
-            <a:pPr lvl="0"/>
-            <a:endParaRPr lang="en-US" dirty="0"/>
-          </a:p>
-        </p:txBody>
-      </p:sp>
-      <p:sp>
-        <p:nvSpPr>
           <p:cNvPr id="13" name="Text Placeholder 12">
             <a:extLst>
               <a:ext uri="{FF2B5EF4-FFF2-40B4-BE49-F238E27FC236}">
@@ -2360,6 +2716,108 @@
           <a:p>
             <a:pPr lvl="0"/>
             <a:endParaRPr lang="en-US" dirty="0"/>
+          </a:p>
+        </p:txBody>
+      </p:sp>
+      <p:sp>
+        <p:nvSpPr>
+          <p:cNvPr id="10" name="Text Placeholder 4">
+            <a:extLst>
+              <a:ext uri="{FF2B5EF4-FFF2-40B4-BE49-F238E27FC236}">
+                <a16:creationId xmlns:a16="http://schemas.microsoft.com/office/drawing/2014/main" id="{088473F9-9820-45EC-867C-E1BAE0A43123}"/>
+              </a:ext>
+            </a:extLst>
+          </p:cNvPr>
+          <p:cNvSpPr>
+            <a:spLocks noGrp="1"/>
+          </p:cNvSpPr>
+          <p:nvPr>
+            <p:ph type="body" sz="quarter" idx="14"/>
+          </p:nvPr>
+        </p:nvSpPr>
+        <p:spPr>
+          <a:xfrm>
+            <a:off x="896112" y="466344"/>
+            <a:ext cx="6080760" cy="1170432"/>
+          </a:xfrm>
+          <a:prstGeom prst="rect">
+            <a:avLst/>
+          </a:prstGeom>
+        </p:spPr>
+        <p:txBody>
+          <a:bodyPr/>
+          <a:lstStyle>
+            <a:lvl1pPr marL="0" indent="0">
+              <a:buNone/>
+              <a:defRPr sz="3000"/>
+            </a:lvl1pPr>
+          </a:lstStyle>
+          <a:p>
+            <a:pPr lvl="0"/>
+            <a:endParaRPr lang="en-US" dirty="0"/>
+          </a:p>
+        </p:txBody>
+      </p:sp>
+      <p:sp>
+        <p:nvSpPr>
+          <p:cNvPr id="11" name="Rectangle: Rounded Corners 10">
+            <a:extLst>
+              <a:ext uri="{FF2B5EF4-FFF2-40B4-BE49-F238E27FC236}">
+                <a16:creationId xmlns:a16="http://schemas.microsoft.com/office/drawing/2014/main" id="{DFF07735-5A9D-461E-B236-B2EA294841B6}"/>
+              </a:ext>
+            </a:extLst>
+          </p:cNvPr>
+          <p:cNvSpPr/>
+          <p:nvPr userDrawn="1"/>
+        </p:nvSpPr>
+        <p:spPr>
+          <a:xfrm>
+            <a:off x="924905" y="1748826"/>
+            <a:ext cx="5403333" cy="473876"/>
+          </a:xfrm>
+          <a:prstGeom prst="roundRect">
+            <a:avLst/>
+          </a:prstGeom>
+          <a:solidFill>
+            <a:srgbClr val="BA9ACA"/>
+          </a:solidFill>
+          <a:ln w="28575">
+            <a:solidFill>
+              <a:srgbClr val="DDCEEA"/>
+            </a:solidFill>
+          </a:ln>
+        </p:spPr>
+        <p:style>
+          <a:lnRef idx="2">
+            <a:schemeClr val="accent1">
+              <a:shade val="50000"/>
+            </a:schemeClr>
+          </a:lnRef>
+          <a:fillRef idx="1">
+            <a:schemeClr val="accent1"/>
+          </a:fillRef>
+          <a:effectRef idx="0">
+            <a:schemeClr val="accent1"/>
+          </a:effectRef>
+          <a:fontRef idx="minor">
+            <a:schemeClr val="lt1"/>
+          </a:fontRef>
+        </p:style>
+        <p:txBody>
+          <a:bodyPr rtlCol="0" anchor="ctr"/>
+          <a:lstStyle/>
+          <a:p>
+            <a:pPr algn="ctr"/>
+            <a:r>
+              <a:rPr lang="en-US" sz="2000" dirty="0">
+                <a:solidFill>
+                  <a:schemeClr val="bg1">
+                    <a:lumMod val="95000"/>
+                  </a:schemeClr>
+                </a:solidFill>
+              </a:rPr>
+              <a:t>This report reflects out-of-the-box performance</a:t>
+            </a:r>
           </a:p>
         </p:txBody>
       </p:sp>
@@ -3282,8 +3740,8 @@
         </p:nvSpPr>
         <p:spPr>
           <a:xfrm>
-            <a:off x="10307383" y="7150163"/>
-            <a:ext cx="4553522" cy="366575"/>
+            <a:off x="10717680" y="7161237"/>
+            <a:ext cx="3738817" cy="366575"/>
           </a:xfrm>
           <a:prstGeom prst="rect">
             <a:avLst/>
@@ -3303,7 +3761,7 @@
               <a:rPr lang="en-US" sz="1782" dirty="0">
                 <a:latin typeface="+mj-lt"/>
               </a:rPr>
-              <a:t>Scatter Plot: Comparison to Reference Monitor</a:t>
+              <a:t>Scatter Plot: Comparison to FRM/FEM</a:t>
             </a:r>
           </a:p>
         </p:txBody>
@@ -3322,8 +3780,8 @@
         </p:nvSpPr>
         <p:spPr>
           <a:xfrm>
-            <a:off x="1339438" y="15474684"/>
-            <a:ext cx="5055899" cy="366254"/>
+            <a:off x="1595706" y="15471934"/>
+            <a:ext cx="4442840" cy="366254"/>
           </a:xfrm>
           <a:prstGeom prst="rect">
             <a:avLst/>
@@ -3343,47 +3801,7 @@
               <a:rPr lang="en-US" sz="1780" dirty="0">
                 <a:latin typeface="+mj-lt"/>
               </a:rPr>
-              <a:t>Hourly Meteorological Conditions During Deployment</a:t>
-            </a:r>
-          </a:p>
-        </p:txBody>
-      </p:sp>
-      <p:sp>
-        <p:nvSpPr>
-          <p:cNvPr id="24" name="TextBox 23">
-            <a:extLst>
-              <a:ext uri="{FF2B5EF4-FFF2-40B4-BE49-F238E27FC236}">
-                <a16:creationId xmlns:a16="http://schemas.microsoft.com/office/drawing/2014/main" id="{E049956A-403C-4054-B4D6-AB0C98529660}"/>
-              </a:ext>
-            </a:extLst>
-          </p:cNvPr>
-          <p:cNvSpPr txBox="1"/>
-          <p:nvPr/>
-        </p:nvSpPr>
-        <p:spPr>
-          <a:xfrm>
-            <a:off x="9720621" y="15475638"/>
-            <a:ext cx="3100782" cy="366254"/>
-          </a:xfrm>
-          <a:prstGeom prst="rect">
-            <a:avLst/>
-          </a:prstGeom>
-          <a:solidFill>
-            <a:schemeClr val="bg1"/>
-          </a:solidFill>
-        </p:spPr>
-        <p:txBody>
-          <a:bodyPr wrap="square" rtlCol="0">
-            <a:spAutoFit/>
-          </a:bodyPr>
-          <a:lstStyle/>
-          <a:p>
-            <a:pPr algn="ctr"/>
-            <a:r>
-              <a:rPr lang="en-US" sz="1780" dirty="0">
-                <a:latin typeface="+mj-lt"/>
-              </a:rPr>
-              <a:t>Hourly Meteorological Influence</a:t>
+              <a:t>Meteorological Conditions During Deployment</a:t>
             </a:r>
           </a:p>
         </p:txBody>
@@ -3660,7 +4078,7 @@
           <p:nvPr>
             <p:extLst>
               <p:ext uri="{D42A27DB-BD31-4B8C-83A1-F6EECF244321}">
-                <p14:modId xmlns:p14="http://schemas.microsoft.com/office/powerpoint/2010/main" val="3127725331"/>
+                <p14:modId xmlns:p14="http://schemas.microsoft.com/office/powerpoint/2010/main" val="4179905371"/>
               </p:ext>
             </p:extLst>
           </p:nvPr>
@@ -3995,14 +4413,30 @@
                       </a:r>
                     </a:p>
                     <a:p>
-                      <a:pPr algn="ctr"/>
+                      <a:pPr marL="0" marR="0" lvl="0" indent="0" algn="ctr" defTabSz="1554480" rtl="0" eaLnBrk="1" fontAlgn="auto" latinLnBrk="0" hangingPunct="1">
+                        <a:lnSpc>
+                          <a:spcPct val="100000"/>
+                        </a:lnSpc>
+                        <a:spcBef>
+                          <a:spcPts val="0"/>
+                        </a:spcBef>
+                        <a:spcAft>
+                          <a:spcPts val="0"/>
+                        </a:spcAft>
+                        <a:buClrTx/>
+                        <a:buSzTx/>
+                        <a:buFontTx/>
+                        <a:buNone/>
+                        <a:tabLst/>
+                        <a:defRPr/>
+                      </a:pPr>
                       <a:r>
                         <a:rPr lang="en-US" sz="1200" b="0" dirty="0">
                           <a:solidFill>
                             <a:sysClr val="windowText" lastClr="000000"/>
                           </a:solidFill>
                         </a:rPr>
-                        <a:t>(City, State; Latitude &amp; Longitude)</a:t>
+                        <a:t>(City, State, Latitude and Longitude)</a:t>
                       </a:r>
                     </a:p>
                   </a:txBody>
@@ -4276,7 +4710,7 @@
                             <a:sysClr val="windowText" lastClr="000000"/>
                           </a:solidFill>
                         </a:rPr>
-                        <a:t>Sampling timeframe </a:t>
+                        <a:t>Sampling timeframe</a:t>
                       </a:r>
                       <a:r>
                         <a:rPr lang="en-US" sz="1200" dirty="0">
@@ -4284,7 +4718,7 @@
                             <a:sysClr val="windowText" lastClr="000000"/>
                           </a:solidFill>
                         </a:rPr>
-                        <a:t>(UTC) </a:t>
+                        <a:t> </a:t>
                       </a:r>
                       <a:endParaRPr lang="en-US" sz="1400" dirty="0">
                         <a:solidFill>
@@ -4432,7 +4866,7 @@
           <p:nvPr>
             <p:extLst>
               <p:ext uri="{D42A27DB-BD31-4B8C-83A1-F6EECF244321}">
-                <p14:modId xmlns:p14="http://schemas.microsoft.com/office/powerpoint/2010/main" val="2025702559"/>
+                <p14:modId xmlns:p14="http://schemas.microsoft.com/office/powerpoint/2010/main" val="15436171"/>
               </p:ext>
             </p:extLst>
           </p:nvPr>
@@ -4476,7 +4910,7 @@
                             <a:sysClr val="windowText" lastClr="000000"/>
                           </a:solidFill>
                         </a:rPr>
-                        <a:t>Range of reference monitor concentrations over duration of base test (ppbv)</a:t>
+                        <a:t>Range of FRM/FEM concentrations over duration of base test (ppbv)</a:t>
                       </a:r>
                     </a:p>
                   </a:txBody>
@@ -4606,7 +5040,7 @@
                     <a:bodyPr/>
                     <a:lstStyle/>
                     <a:p>
-                      <a:pPr marL="0" marR="0" lvl="0" indent="0" algn="l" defTabSz="1554480" rtl="0" eaLnBrk="1" fontAlgn="auto" latinLnBrk="0" hangingPunct="1">
+                      <a:pPr marL="0" marR="0" lvl="0" indent="0" algn="ctr" defTabSz="1554480" rtl="0" eaLnBrk="1" fontAlgn="auto" latinLnBrk="0" hangingPunct="1">
                         <a:lnSpc>
                           <a:spcPct val="100000"/>
                         </a:lnSpc>
@@ -4629,687 +5063,7 @@
                             <a:sysClr val="windowText" lastClr="000000"/>
                           </a:solidFill>
                         </a:rPr>
-                        <a:t>Number 1-hr periods in reference monitor measurements outside concentration value target criteria </a:t>
-                      </a:r>
-                    </a:p>
-                  </a:txBody>
-                  <a:tcPr marL="45720" marR="45720" anchor="ctr">
-                    <a:lnL w="12700" cap="flat" cmpd="sng" algn="ctr">
-                      <a:solidFill>
-                        <a:schemeClr val="bg1"/>
-                      </a:solidFill>
-                      <a:prstDash val="solid"/>
-                      <a:round/>
-                      <a:headEnd type="none" w="med" len="med"/>
-                      <a:tailEnd type="none" w="med" len="med"/>
-                    </a:lnL>
-                    <a:lnR w="12700" cap="flat" cmpd="sng" algn="ctr">
-                      <a:solidFill>
-                        <a:schemeClr val="bg1"/>
-                      </a:solidFill>
-                      <a:prstDash val="solid"/>
-                      <a:round/>
-                      <a:headEnd type="none" w="med" len="med"/>
-                      <a:tailEnd type="none" w="med" len="med"/>
-                    </a:lnR>
-                    <a:lnT w="12700" cap="flat" cmpd="sng" algn="ctr">
-                      <a:solidFill>
-                        <a:schemeClr val="bg1"/>
-                      </a:solidFill>
-                      <a:prstDash val="solid"/>
-                      <a:round/>
-                      <a:headEnd type="none" w="med" len="med"/>
-                      <a:tailEnd type="none" w="med" len="med"/>
-                    </a:lnT>
-                    <a:lnB w="12700" cap="flat" cmpd="sng" algn="ctr">
-                      <a:solidFill>
-                        <a:schemeClr val="bg1"/>
-                      </a:solidFill>
-                      <a:prstDash val="solid"/>
-                      <a:round/>
-                      <a:headEnd type="none" w="med" len="med"/>
-                      <a:tailEnd type="none" w="med" len="med"/>
-                    </a:lnB>
-                    <a:lnTlToBr w="12700" cmpd="sng">
-                      <a:noFill/>
-                      <a:prstDash val="solid"/>
-                    </a:lnTlToBr>
-                    <a:lnBlToTr w="12700" cmpd="sng">
-                      <a:noFill/>
-                      <a:prstDash val="solid"/>
-                    </a:lnBlToTr>
-                    <a:solidFill>
-                      <a:srgbClr val="BFD0EB"/>
-                    </a:solidFill>
-                  </a:tcPr>
-                </a:tc>
-                <a:tc>
-                  <a:txBody>
-                    <a:bodyPr/>
-                    <a:lstStyle/>
-                    <a:p>
-                      <a:pPr algn="ctr"/>
-                      <a:endParaRPr lang="en-US" sz="1400" dirty="0">
-                        <a:solidFill>
-                          <a:sysClr val="windowText" lastClr="000000"/>
-                        </a:solidFill>
-                        <a:latin typeface="+mn-lt"/>
-                      </a:endParaRPr>
-                    </a:p>
-                  </a:txBody>
-                  <a:tcPr marL="45720" marR="45720" anchor="ctr">
-                    <a:lnL w="12700" cap="flat" cmpd="sng" algn="ctr">
-                      <a:solidFill>
-                        <a:schemeClr val="bg1"/>
-                      </a:solidFill>
-                      <a:prstDash val="solid"/>
-                      <a:round/>
-                      <a:headEnd type="none" w="med" len="med"/>
-                      <a:tailEnd type="none" w="med" len="med"/>
-                    </a:lnL>
-                    <a:lnR w="12700" cap="flat" cmpd="sng" algn="ctr">
-                      <a:solidFill>
-                        <a:schemeClr val="bg1"/>
-                      </a:solidFill>
-                      <a:prstDash val="solid"/>
-                      <a:round/>
-                      <a:headEnd type="none" w="med" len="med"/>
-                      <a:tailEnd type="none" w="med" len="med"/>
-                    </a:lnR>
-                    <a:lnT w="12700" cap="flat" cmpd="sng" algn="ctr">
-                      <a:solidFill>
-                        <a:schemeClr val="bg1"/>
-                      </a:solidFill>
-                      <a:prstDash val="solid"/>
-                      <a:round/>
-                      <a:headEnd type="none" w="med" len="med"/>
-                      <a:tailEnd type="none" w="med" len="med"/>
-                    </a:lnT>
-                    <a:lnB w="12700" cap="flat" cmpd="sng" algn="ctr">
-                      <a:solidFill>
-                        <a:schemeClr val="bg1"/>
-                      </a:solidFill>
-                      <a:prstDash val="solid"/>
-                      <a:round/>
-                      <a:headEnd type="none" w="med" len="med"/>
-                      <a:tailEnd type="none" w="med" len="med"/>
-                    </a:lnB>
-                    <a:lnTlToBr w="12700" cmpd="sng">
-                      <a:noFill/>
-                      <a:prstDash val="solid"/>
-                    </a:lnTlToBr>
-                    <a:lnBlToTr w="12700" cmpd="sng">
-                      <a:noFill/>
-                      <a:prstDash val="solid"/>
-                    </a:lnBlToTr>
-                    <a:solidFill>
-                      <a:srgbClr val="E8EEF8"/>
-                    </a:solidFill>
-                  </a:tcPr>
-                </a:tc>
-                <a:extLst>
-                  <a:ext uri="{0D108BD9-81ED-4DB2-BD59-A6C34878D82A}">
-                    <a16:rowId xmlns:a16="http://schemas.microsoft.com/office/drawing/2014/main" val="337105121"/>
-                  </a:ext>
-                </a:extLst>
-              </a:tr>
-            </a:tbl>
-          </a:graphicData>
-        </a:graphic>
-      </p:graphicFrame>
-      <p:graphicFrame>
-        <p:nvGraphicFramePr>
-          <p:cNvPr id="48" name="Table 18">
-            <a:extLst>
-              <a:ext uri="{FF2B5EF4-FFF2-40B4-BE49-F238E27FC236}">
-                <a16:creationId xmlns:a16="http://schemas.microsoft.com/office/drawing/2014/main" id="{AEF6C188-35F2-47DE-9D82-969D34B1EECF}"/>
-              </a:ext>
-            </a:extLst>
-          </p:cNvPr>
-          <p:cNvGraphicFramePr>
-            <a:graphicFrameLocks noGrp="1"/>
-          </p:cNvGraphicFramePr>
-          <p:nvPr>
-            <p:extLst>
-              <p:ext uri="{D42A27DB-BD31-4B8C-83A1-F6EECF244321}">
-                <p14:modId xmlns:p14="http://schemas.microsoft.com/office/powerpoint/2010/main" val="3590080972"/>
-              </p:ext>
-            </p:extLst>
-          </p:nvPr>
-        </p:nvGraphicFramePr>
-        <p:xfrm>
-          <a:off x="7887190" y="18343988"/>
-          <a:ext cx="4292660" cy="1175556"/>
-        </p:xfrm>
-        <a:graphic>
-          <a:graphicData uri="http://schemas.openxmlformats.org/drawingml/2006/table">
-            <a:tbl>
-              <a:tblPr firstRow="1" bandRow="1">
-                <a:tableStyleId>{69CF1AB2-1976-4502-BF36-3FF5EA218861}</a:tableStyleId>
-              </a:tblPr>
-              <a:tblGrid>
-                <a:gridCol w="3191504">
-                  <a:extLst>
-                    <a:ext uri="{9D8B030D-6E8A-4147-A177-3AD203B41FA5}">
-                      <a16:colId xmlns:a16="http://schemas.microsoft.com/office/drawing/2014/main" val="3814208030"/>
-                    </a:ext>
-                  </a:extLst>
-                </a:gridCol>
-                <a:gridCol w="1101156">
-                  <a:extLst>
-                    <a:ext uri="{9D8B030D-6E8A-4147-A177-3AD203B41FA5}">
-                      <a16:colId xmlns:a16="http://schemas.microsoft.com/office/drawing/2014/main" val="1546040442"/>
-                    </a:ext>
-                  </a:extLst>
-                </a:gridCol>
-              </a:tblGrid>
-              <a:tr h="587778">
-                <a:tc>
-                  <a:txBody>
-                    <a:bodyPr/>
-                    <a:lstStyle/>
-                    <a:p>
-                      <a:pPr algn="l"/>
-                      <a:r>
-                        <a:rPr lang="en-US" sz="1200" b="0" dirty="0">
-                          <a:solidFill>
-                            <a:sysClr val="windowText" lastClr="000000"/>
-                          </a:solidFill>
-                        </a:rPr>
-                        <a:t>Number of paired, normalized concentration and temperature values</a:t>
-                      </a:r>
-                    </a:p>
-                  </a:txBody>
-                  <a:tcPr marL="45720" marR="45720" anchor="ctr">
-                    <a:lnL w="12700" cap="flat" cmpd="sng" algn="ctr">
-                      <a:solidFill>
-                        <a:schemeClr val="bg1"/>
-                      </a:solidFill>
-                      <a:prstDash val="solid"/>
-                      <a:round/>
-                      <a:headEnd type="none" w="med" len="med"/>
-                      <a:tailEnd type="none" w="med" len="med"/>
-                    </a:lnL>
-                    <a:lnR w="12700" cap="flat" cmpd="sng" algn="ctr">
-                      <a:solidFill>
-                        <a:schemeClr val="bg1"/>
-                      </a:solidFill>
-                      <a:prstDash val="solid"/>
-                      <a:round/>
-                      <a:headEnd type="none" w="med" len="med"/>
-                      <a:tailEnd type="none" w="med" len="med"/>
-                    </a:lnR>
-                    <a:lnT w="12700" cap="flat" cmpd="sng" algn="ctr">
-                      <a:solidFill>
-                        <a:schemeClr val="bg1"/>
-                      </a:solidFill>
-                      <a:prstDash val="solid"/>
-                      <a:round/>
-                      <a:headEnd type="none" w="med" len="med"/>
-                      <a:tailEnd type="none" w="med" len="med"/>
-                    </a:lnT>
-                    <a:lnB w="12700" cap="flat" cmpd="sng" algn="ctr">
-                      <a:solidFill>
-                        <a:schemeClr val="bg1"/>
-                      </a:solidFill>
-                      <a:prstDash val="solid"/>
-                      <a:round/>
-                      <a:headEnd type="none" w="med" len="med"/>
-                      <a:tailEnd type="none" w="med" len="med"/>
-                    </a:lnB>
-                    <a:lnTlToBr w="12700" cmpd="sng">
-                      <a:noFill/>
-                      <a:prstDash val="solid"/>
-                    </a:lnTlToBr>
-                    <a:lnBlToTr w="12700" cmpd="sng">
-                      <a:noFill/>
-                      <a:prstDash val="solid"/>
-                    </a:lnBlToTr>
-                    <a:solidFill>
-                      <a:srgbClr val="BFD0EB"/>
-                    </a:solidFill>
-                  </a:tcPr>
-                </a:tc>
-                <a:tc>
-                  <a:txBody>
-                    <a:bodyPr/>
-                    <a:lstStyle/>
-                    <a:p>
-                      <a:pPr algn="ctr"/>
-                      <a:endParaRPr lang="en-US" sz="1400" dirty="0">
-                        <a:solidFill>
-                          <a:sysClr val="windowText" lastClr="000000"/>
-                        </a:solidFill>
-                        <a:latin typeface="+mn-lt"/>
-                      </a:endParaRPr>
-                    </a:p>
-                  </a:txBody>
-                  <a:tcPr marL="45720" marR="45720" anchor="ctr">
-                    <a:lnL w="12700" cap="flat" cmpd="sng" algn="ctr">
-                      <a:solidFill>
-                        <a:schemeClr val="bg1"/>
-                      </a:solidFill>
-                      <a:prstDash val="solid"/>
-                      <a:round/>
-                      <a:headEnd type="none" w="med" len="med"/>
-                      <a:tailEnd type="none" w="med" len="med"/>
-                    </a:lnL>
-                    <a:lnR w="12700" cap="flat" cmpd="sng" algn="ctr">
-                      <a:solidFill>
-                        <a:schemeClr val="bg1"/>
-                      </a:solidFill>
-                      <a:prstDash val="solid"/>
-                      <a:round/>
-                      <a:headEnd type="none" w="med" len="med"/>
-                      <a:tailEnd type="none" w="med" len="med"/>
-                    </a:lnR>
-                    <a:lnT w="12700" cap="flat" cmpd="sng" algn="ctr">
-                      <a:solidFill>
-                        <a:schemeClr val="bg1"/>
-                      </a:solidFill>
-                      <a:prstDash val="solid"/>
-                      <a:round/>
-                      <a:headEnd type="none" w="med" len="med"/>
-                      <a:tailEnd type="none" w="med" len="med"/>
-                    </a:lnT>
-                    <a:lnB w="12700" cap="flat" cmpd="sng" algn="ctr">
-                      <a:solidFill>
-                        <a:schemeClr val="bg1"/>
-                      </a:solidFill>
-                      <a:prstDash val="solid"/>
-                      <a:round/>
-                      <a:headEnd type="none" w="med" len="med"/>
-                      <a:tailEnd type="none" w="med" len="med"/>
-                    </a:lnB>
-                    <a:lnTlToBr w="12700" cmpd="sng">
-                      <a:noFill/>
-                      <a:prstDash val="solid"/>
-                    </a:lnTlToBr>
-                    <a:lnBlToTr w="12700" cmpd="sng">
-                      <a:noFill/>
-                      <a:prstDash val="solid"/>
-                    </a:lnBlToTr>
-                    <a:solidFill>
-                      <a:srgbClr val="E8EEF8"/>
-                    </a:solidFill>
-                  </a:tcPr>
-                </a:tc>
-                <a:extLst>
-                  <a:ext uri="{0D108BD9-81ED-4DB2-BD59-A6C34878D82A}">
-                    <a16:rowId xmlns:a16="http://schemas.microsoft.com/office/drawing/2014/main" val="1499110780"/>
-                  </a:ext>
-                </a:extLst>
-              </a:tr>
-              <a:tr h="587778">
-                <a:tc>
-                  <a:txBody>
-                    <a:bodyPr/>
-                    <a:lstStyle/>
-                    <a:p>
-                      <a:pPr marL="0" marR="0" lvl="0" indent="0" algn="l" defTabSz="1554480" rtl="0" eaLnBrk="1" fontAlgn="auto" latinLnBrk="0" hangingPunct="1">
-                        <a:lnSpc>
-                          <a:spcPct val="100000"/>
-                        </a:lnSpc>
-                        <a:spcBef>
-                          <a:spcPts val="0"/>
-                        </a:spcBef>
-                        <a:spcAft>
-                          <a:spcPts val="0"/>
-                        </a:spcAft>
-                        <a:buClrTx/>
-                        <a:buSzTx/>
-                        <a:buFontTx/>
-                        <a:buNone/>
-                        <a:tabLst/>
-                        <a:defRPr/>
-                      </a:pPr>
-                      <a:r>
-                        <a:rPr lang="en-US" sz="1200" b="0" dirty="0">
-                          <a:solidFill>
-                            <a:sysClr val="windowText" lastClr="000000"/>
-                          </a:solidFill>
-                        </a:rPr>
-                        <a:t>Number of paired, normalized concentration and relative humidity values</a:t>
-                      </a:r>
-                    </a:p>
-                  </a:txBody>
-                  <a:tcPr marL="45720" marR="45720" anchor="ctr">
-                    <a:lnL w="12700" cap="flat" cmpd="sng" algn="ctr">
-                      <a:solidFill>
-                        <a:schemeClr val="bg1"/>
-                      </a:solidFill>
-                      <a:prstDash val="solid"/>
-                      <a:round/>
-                      <a:headEnd type="none" w="med" len="med"/>
-                      <a:tailEnd type="none" w="med" len="med"/>
-                    </a:lnL>
-                    <a:lnR w="12700" cap="flat" cmpd="sng" algn="ctr">
-                      <a:solidFill>
-                        <a:schemeClr val="bg1"/>
-                      </a:solidFill>
-                      <a:prstDash val="solid"/>
-                      <a:round/>
-                      <a:headEnd type="none" w="med" len="med"/>
-                      <a:tailEnd type="none" w="med" len="med"/>
-                    </a:lnR>
-                    <a:lnT w="12700" cap="flat" cmpd="sng" algn="ctr">
-                      <a:solidFill>
-                        <a:schemeClr val="bg1"/>
-                      </a:solidFill>
-                      <a:prstDash val="solid"/>
-                      <a:round/>
-                      <a:headEnd type="none" w="med" len="med"/>
-                      <a:tailEnd type="none" w="med" len="med"/>
-                    </a:lnT>
-                    <a:lnB w="12700" cap="flat" cmpd="sng" algn="ctr">
-                      <a:solidFill>
-                        <a:schemeClr val="bg1"/>
-                      </a:solidFill>
-                      <a:prstDash val="solid"/>
-                      <a:round/>
-                      <a:headEnd type="none" w="med" len="med"/>
-                      <a:tailEnd type="none" w="med" len="med"/>
-                    </a:lnB>
-                    <a:lnTlToBr w="12700" cmpd="sng">
-                      <a:noFill/>
-                      <a:prstDash val="solid"/>
-                    </a:lnTlToBr>
-                    <a:lnBlToTr w="12700" cmpd="sng">
-                      <a:noFill/>
-                      <a:prstDash val="solid"/>
-                    </a:lnBlToTr>
-                    <a:solidFill>
-                      <a:srgbClr val="BFD0EB"/>
-                    </a:solidFill>
-                  </a:tcPr>
-                </a:tc>
-                <a:tc>
-                  <a:txBody>
-                    <a:bodyPr/>
-                    <a:lstStyle/>
-                    <a:p>
-                      <a:pPr algn="ctr"/>
-                      <a:endParaRPr lang="en-US" sz="1400" dirty="0">
-                        <a:solidFill>
-                          <a:sysClr val="windowText" lastClr="000000"/>
-                        </a:solidFill>
-                        <a:latin typeface="+mn-lt"/>
-                      </a:endParaRPr>
-                    </a:p>
-                  </a:txBody>
-                  <a:tcPr marL="45720" marR="45720" anchor="ctr">
-                    <a:lnL w="12700" cap="flat" cmpd="sng" algn="ctr">
-                      <a:solidFill>
-                        <a:schemeClr val="bg1"/>
-                      </a:solidFill>
-                      <a:prstDash val="solid"/>
-                      <a:round/>
-                      <a:headEnd type="none" w="med" len="med"/>
-                      <a:tailEnd type="none" w="med" len="med"/>
-                    </a:lnL>
-                    <a:lnR w="12700" cap="flat" cmpd="sng" algn="ctr">
-                      <a:solidFill>
-                        <a:schemeClr val="bg1"/>
-                      </a:solidFill>
-                      <a:prstDash val="solid"/>
-                      <a:round/>
-                      <a:headEnd type="none" w="med" len="med"/>
-                      <a:tailEnd type="none" w="med" len="med"/>
-                    </a:lnR>
-                    <a:lnT w="12700" cap="flat" cmpd="sng" algn="ctr">
-                      <a:solidFill>
-                        <a:schemeClr val="bg1"/>
-                      </a:solidFill>
-                      <a:prstDash val="solid"/>
-                      <a:round/>
-                      <a:headEnd type="none" w="med" len="med"/>
-                      <a:tailEnd type="none" w="med" len="med"/>
-                    </a:lnT>
-                    <a:lnB w="12700" cap="flat" cmpd="sng" algn="ctr">
-                      <a:solidFill>
-                        <a:schemeClr val="bg1"/>
-                      </a:solidFill>
-                      <a:prstDash val="solid"/>
-                      <a:round/>
-                      <a:headEnd type="none" w="med" len="med"/>
-                      <a:tailEnd type="none" w="med" len="med"/>
-                    </a:lnB>
-                    <a:lnTlToBr w="12700" cmpd="sng">
-                      <a:noFill/>
-                      <a:prstDash val="solid"/>
-                    </a:lnTlToBr>
-                    <a:lnBlToTr w="12700" cmpd="sng">
-                      <a:noFill/>
-                      <a:prstDash val="solid"/>
-                    </a:lnBlToTr>
-                    <a:solidFill>
-                      <a:srgbClr val="E8EEF8"/>
-                    </a:solidFill>
-                  </a:tcPr>
-                </a:tc>
-                <a:extLst>
-                  <a:ext uri="{0D108BD9-81ED-4DB2-BD59-A6C34878D82A}">
-                    <a16:rowId xmlns:a16="http://schemas.microsoft.com/office/drawing/2014/main" val="337105121"/>
-                  </a:ext>
-                </a:extLst>
-              </a:tr>
-            </a:tbl>
-          </a:graphicData>
-        </a:graphic>
-      </p:graphicFrame>
-      <p:graphicFrame>
-        <p:nvGraphicFramePr>
-          <p:cNvPr id="45" name="Table 18">
-            <a:extLst>
-              <a:ext uri="{FF2B5EF4-FFF2-40B4-BE49-F238E27FC236}">
-                <a16:creationId xmlns:a16="http://schemas.microsoft.com/office/drawing/2014/main" id="{CF285BA3-2F77-44D6-A90D-FA09A3ABA0E1}"/>
-              </a:ext>
-            </a:extLst>
-          </p:cNvPr>
-          <p:cNvGraphicFramePr>
-            <a:graphicFrameLocks noGrp="1"/>
-          </p:cNvGraphicFramePr>
-          <p:nvPr>
-            <p:extLst>
-              <p:ext uri="{D42A27DB-BD31-4B8C-83A1-F6EECF244321}">
-                <p14:modId xmlns:p14="http://schemas.microsoft.com/office/powerpoint/2010/main" val="1360085383"/>
-              </p:ext>
-            </p:extLst>
-          </p:nvPr>
-        </p:nvGraphicFramePr>
-        <p:xfrm>
-          <a:off x="1927420" y="18343988"/>
-          <a:ext cx="3839601" cy="1175556"/>
-        </p:xfrm>
-        <a:graphic>
-          <a:graphicData uri="http://schemas.openxmlformats.org/drawingml/2006/table">
-            <a:tbl>
-              <a:tblPr firstRow="1" bandRow="1">
-                <a:tableStyleId>{69CF1AB2-1976-4502-BF36-3FF5EA218861}</a:tableStyleId>
-              </a:tblPr>
-              <a:tblGrid>
-                <a:gridCol w="2474607">
-                  <a:extLst>
-                    <a:ext uri="{9D8B030D-6E8A-4147-A177-3AD203B41FA5}">
-                      <a16:colId xmlns:a16="http://schemas.microsoft.com/office/drawing/2014/main" val="3814208030"/>
-                    </a:ext>
-                  </a:extLst>
-                </a:gridCol>
-                <a:gridCol w="1364994">
-                  <a:extLst>
-                    <a:ext uri="{9D8B030D-6E8A-4147-A177-3AD203B41FA5}">
-                      <a16:colId xmlns:a16="http://schemas.microsoft.com/office/drawing/2014/main" val="1546040442"/>
-                    </a:ext>
-                  </a:extLst>
-                </a:gridCol>
-              </a:tblGrid>
-              <a:tr h="587778">
-                <a:tc>
-                  <a:txBody>
-                    <a:bodyPr/>
-                    <a:lstStyle/>
-                    <a:p>
-                      <a:pPr algn="l"/>
-                      <a:r>
-                        <a:rPr lang="en-US" sz="1200" b="0" dirty="0">
-                          <a:solidFill>
-                            <a:sysClr val="windowText" lastClr="000000"/>
-                          </a:solidFill>
-                        </a:rPr>
-                        <a:t>Number of 24-hr periods outside temperature target criteria</a:t>
-                      </a:r>
-                    </a:p>
-                  </a:txBody>
-                  <a:tcPr marL="45720" marR="45720" anchor="ctr">
-                    <a:lnL w="12700" cap="flat" cmpd="sng" algn="ctr">
-                      <a:solidFill>
-                        <a:schemeClr val="bg1"/>
-                      </a:solidFill>
-                      <a:prstDash val="solid"/>
-                      <a:round/>
-                      <a:headEnd type="none" w="med" len="med"/>
-                      <a:tailEnd type="none" w="med" len="med"/>
-                    </a:lnL>
-                    <a:lnR w="12700" cap="flat" cmpd="sng" algn="ctr">
-                      <a:solidFill>
-                        <a:schemeClr val="bg1"/>
-                      </a:solidFill>
-                      <a:prstDash val="solid"/>
-                      <a:round/>
-                      <a:headEnd type="none" w="med" len="med"/>
-                      <a:tailEnd type="none" w="med" len="med"/>
-                    </a:lnR>
-                    <a:lnT w="12700" cap="flat" cmpd="sng" algn="ctr">
-                      <a:solidFill>
-                        <a:schemeClr val="bg1"/>
-                      </a:solidFill>
-                      <a:prstDash val="solid"/>
-                      <a:round/>
-                      <a:headEnd type="none" w="med" len="med"/>
-                      <a:tailEnd type="none" w="med" len="med"/>
-                    </a:lnT>
-                    <a:lnB w="12700" cap="flat" cmpd="sng" algn="ctr">
-                      <a:solidFill>
-                        <a:schemeClr val="bg1"/>
-                      </a:solidFill>
-                      <a:prstDash val="solid"/>
-                      <a:round/>
-                      <a:headEnd type="none" w="med" len="med"/>
-                      <a:tailEnd type="none" w="med" len="med"/>
-                    </a:lnB>
-                    <a:lnTlToBr w="12700" cmpd="sng">
-                      <a:noFill/>
-                      <a:prstDash val="solid"/>
-                    </a:lnTlToBr>
-                    <a:lnBlToTr w="12700" cmpd="sng">
-                      <a:noFill/>
-                      <a:prstDash val="solid"/>
-                    </a:lnBlToTr>
-                    <a:solidFill>
-                      <a:srgbClr val="BFD0EB"/>
-                    </a:solidFill>
-                  </a:tcPr>
-                </a:tc>
-                <a:tc>
-                  <a:txBody>
-                    <a:bodyPr/>
-                    <a:lstStyle/>
-                    <a:p>
-                      <a:pPr algn="ctr"/>
-                      <a:endParaRPr lang="en-US" sz="1400" dirty="0">
-                        <a:solidFill>
-                          <a:sysClr val="windowText" lastClr="000000"/>
-                        </a:solidFill>
-                        <a:latin typeface="+mn-lt"/>
-                      </a:endParaRPr>
-                    </a:p>
-                  </a:txBody>
-                  <a:tcPr marL="45720" marR="45720" anchor="ctr">
-                    <a:lnL w="12700" cap="flat" cmpd="sng" algn="ctr">
-                      <a:solidFill>
-                        <a:schemeClr val="bg1"/>
-                      </a:solidFill>
-                      <a:prstDash val="solid"/>
-                      <a:round/>
-                      <a:headEnd type="none" w="med" len="med"/>
-                      <a:tailEnd type="none" w="med" len="med"/>
-                    </a:lnL>
-                    <a:lnR w="12700" cap="flat" cmpd="sng" algn="ctr">
-                      <a:solidFill>
-                        <a:schemeClr val="bg1"/>
-                      </a:solidFill>
-                      <a:prstDash val="solid"/>
-                      <a:round/>
-                      <a:headEnd type="none" w="med" len="med"/>
-                      <a:tailEnd type="none" w="med" len="med"/>
-                    </a:lnR>
-                    <a:lnT w="12700" cap="flat" cmpd="sng" algn="ctr">
-                      <a:solidFill>
-                        <a:schemeClr val="bg1"/>
-                      </a:solidFill>
-                      <a:prstDash val="solid"/>
-                      <a:round/>
-                      <a:headEnd type="none" w="med" len="med"/>
-                      <a:tailEnd type="none" w="med" len="med"/>
-                    </a:lnT>
-                    <a:lnB w="12700" cap="flat" cmpd="sng" algn="ctr">
-                      <a:solidFill>
-                        <a:schemeClr val="bg1"/>
-                      </a:solidFill>
-                      <a:prstDash val="solid"/>
-                      <a:round/>
-                      <a:headEnd type="none" w="med" len="med"/>
-                      <a:tailEnd type="none" w="med" len="med"/>
-                    </a:lnB>
-                    <a:lnTlToBr w="12700" cmpd="sng">
-                      <a:noFill/>
-                      <a:prstDash val="solid"/>
-                    </a:lnTlToBr>
-                    <a:lnBlToTr w="12700" cmpd="sng">
-                      <a:noFill/>
-                      <a:prstDash val="solid"/>
-                    </a:lnBlToTr>
-                    <a:solidFill>
-                      <a:srgbClr val="E8EEF8"/>
-                    </a:solidFill>
-                  </a:tcPr>
-                </a:tc>
-                <a:extLst>
-                  <a:ext uri="{0D108BD9-81ED-4DB2-BD59-A6C34878D82A}">
-                    <a16:rowId xmlns:a16="http://schemas.microsoft.com/office/drawing/2014/main" val="1499110780"/>
-                  </a:ext>
-                </a:extLst>
-              </a:tr>
-              <a:tr h="587778">
-                <a:tc>
-                  <a:txBody>
-                    <a:bodyPr/>
-                    <a:lstStyle/>
-                    <a:p>
-                      <a:pPr marL="0" marR="0" lvl="0" indent="0" algn="l" defTabSz="1554480" rtl="0" eaLnBrk="1" fontAlgn="auto" latinLnBrk="0" hangingPunct="1">
-                        <a:lnSpc>
-                          <a:spcPct val="100000"/>
-                        </a:lnSpc>
-                        <a:spcBef>
-                          <a:spcPts val="0"/>
-                        </a:spcBef>
-                        <a:spcAft>
-                          <a:spcPts val="0"/>
-                        </a:spcAft>
-                        <a:buClrTx/>
-                        <a:buSzTx/>
-                        <a:buFontTx/>
-                        <a:buNone/>
-                        <a:tabLst/>
-                        <a:defRPr/>
-                      </a:pPr>
-                      <a:r>
-                        <a:rPr lang="en-US" sz="1200" b="0" dirty="0">
-                          <a:solidFill>
-                            <a:sysClr val="windowText" lastClr="000000"/>
-                          </a:solidFill>
-                        </a:rPr>
-                        <a:t>Number of 24-hr periods outside relative humidity target criteria</a:t>
+                        <a:t>Number of 1-hr periods in FRM/FEM monitor measurements with a goal concentration ≥ 60 ppbv</a:t>
                       </a:r>
                     </a:p>
                   </a:txBody>
@@ -5452,7 +5206,7 @@
           <p:nvPr>
             <p:extLst>
               <p:ext uri="{D42A27DB-BD31-4B8C-83A1-F6EECF244321}">
-                <p14:modId xmlns:p14="http://schemas.microsoft.com/office/powerpoint/2010/main" val="3881023466"/>
+                <p14:modId xmlns:p14="http://schemas.microsoft.com/office/powerpoint/2010/main" val="4073693233"/>
               </p:ext>
             </p:extLst>
           </p:nvPr>
@@ -5496,7 +5250,7 @@
                             <a:sysClr val="windowText" lastClr="000000"/>
                           </a:solidFill>
                         </a:rPr>
-                        <a:t>Reference Monitor Information</a:t>
+                        <a:t>FRM/FEM Information</a:t>
                       </a:r>
                     </a:p>
                   </a:txBody>
@@ -5770,7 +5524,18 @@
                             <a:sysClr val="windowText" lastClr="000000"/>
                           </a:solidFill>
                         </a:rPr>
-                        <a:t>Measurement recording interval</a:t>
+                        <a:t>Sampling time</a:t>
+                      </a:r>
+                    </a:p>
+                    <a:p>
+                      <a:pPr algn="ctr"/>
+                      <a:r>
+                        <a:rPr lang="en-US" sz="1400" b="0" dirty="0">
+                          <a:solidFill>
+                            <a:sysClr val="windowText" lastClr="000000"/>
+                          </a:solidFill>
+                        </a:rPr>
+                        <a:t>interval</a:t>
                       </a:r>
                     </a:p>
                   </a:txBody>
@@ -6324,7 +6089,7 @@
           <p:nvPr>
             <p:extLst>
               <p:ext uri="{D42A27DB-BD31-4B8C-83A1-F6EECF244321}">
-                <p14:modId xmlns:p14="http://schemas.microsoft.com/office/powerpoint/2010/main" val="2848003370"/>
+                <p14:modId xmlns:p14="http://schemas.microsoft.com/office/powerpoint/2010/main" val="3346372611"/>
               </p:ext>
             </p:extLst>
           </p:nvPr>
@@ -6921,7 +6686,18 @@
                             <a:sysClr val="windowText" lastClr="000000"/>
                           </a:solidFill>
                         </a:rPr>
-                        <a:t>Measurement recording interval</a:t>
+                        <a:t>Sampling time </a:t>
+                      </a:r>
+                    </a:p>
+                    <a:p>
+                      <a:pPr algn="ctr"/>
+                      <a:r>
+                        <a:rPr lang="en-US" sz="1400" b="0" dirty="0">
+                          <a:solidFill>
+                            <a:sysClr val="windowText" lastClr="000000"/>
+                          </a:solidFill>
+                        </a:rPr>
+                        <a:t>interval</a:t>
                       </a:r>
                     </a:p>
                   </a:txBody>
@@ -7098,7 +6874,18 @@
                             <a:sysClr val="windowText" lastClr="000000"/>
                           </a:solidFill>
                         </a:rPr>
-                        <a:t>Sensor serial numbers</a:t>
+                        <a:t>Sensor serial</a:t>
+                      </a:r>
+                    </a:p>
+                    <a:p>
+                      <a:pPr algn="ctr"/>
+                      <a:r>
+                        <a:rPr lang="en-US" sz="1400" dirty="0">
+                          <a:solidFill>
+                            <a:sysClr val="windowText" lastClr="000000"/>
+                          </a:solidFill>
+                        </a:rPr>
+                        <a:t>numbers</a:t>
                       </a:r>
                     </a:p>
                   </a:txBody>
@@ -8186,7 +7973,7 @@
                           </a:solidFill>
                           <a:latin typeface="+mn-lt"/>
                         </a:rPr>
-                        <a:t>Brief synopsis of issues</a:t>
+                        <a:t>Brief summary of issues</a:t>
                       </a:r>
                       <a:endParaRPr lang="en-US" dirty="0"/>
                     </a:p>
@@ -8381,10 +8168,10 @@
       </p:graphicFrame>
       <p:sp>
         <p:nvSpPr>
-          <p:cNvPr id="2" name="Picture Placeholder 1">
+          <p:cNvPr id="3" name="Picture Placeholder 2">
             <a:extLst>
               <a:ext uri="{FF2B5EF4-FFF2-40B4-BE49-F238E27FC236}">
-                <a16:creationId xmlns:a16="http://schemas.microsoft.com/office/drawing/2014/main" id="{D3BBE3C6-F1E4-4D42-8855-1B38098D718D}"/>
+                <a16:creationId xmlns:a16="http://schemas.microsoft.com/office/drawing/2014/main" id="{E496A7F8-43F8-4BAA-ACE7-4F2FD405C445}"/>
               </a:ext>
             </a:extLst>
           </p:cNvPr>
@@ -8399,10 +8186,10 @@
       </p:sp>
       <p:sp>
         <p:nvSpPr>
-          <p:cNvPr id="5" name="Text Placeholder 4">
+          <p:cNvPr id="7" name="Text Placeholder 6">
             <a:extLst>
               <a:ext uri="{FF2B5EF4-FFF2-40B4-BE49-F238E27FC236}">
-                <a16:creationId xmlns:a16="http://schemas.microsoft.com/office/drawing/2014/main" id="{59B1715C-505C-471D-AC7B-8D5512F1F59D}"/>
+                <a16:creationId xmlns:a16="http://schemas.microsoft.com/office/drawing/2014/main" id="{1F867A50-C366-451C-B510-1358A8E03B8F}"/>
               </a:ext>
             </a:extLst>
           </p:cNvPr>
@@ -8424,10 +8211,10 @@
       </p:sp>
       <p:sp>
         <p:nvSpPr>
-          <p:cNvPr id="4" name="Text Placeholder 3">
+          <p:cNvPr id="6" name="Text Placeholder 5">
             <a:extLst>
               <a:ext uri="{FF2B5EF4-FFF2-40B4-BE49-F238E27FC236}">
-                <a16:creationId xmlns:a16="http://schemas.microsoft.com/office/drawing/2014/main" id="{C1F6EC70-09A5-49CF-8C1A-8D0EB117AC03}"/>
+                <a16:creationId xmlns:a16="http://schemas.microsoft.com/office/drawing/2014/main" id="{A96546AC-36CF-4A51-A082-C4DB57591699}"/>
               </a:ext>
             </a:extLst>
           </p:cNvPr>
@@ -8443,7 +8230,727 @@
           <a:bodyPr/>
           <a:lstStyle/>
           <a:p>
-            <a:endParaRPr lang="en-US" dirty="0"/>
+            <a:endParaRPr lang="en-US"/>
+          </a:p>
+        </p:txBody>
+      </p:sp>
+      <p:graphicFrame>
+        <p:nvGraphicFramePr>
+          <p:cNvPr id="32" name="Table 18">
+            <a:extLst>
+              <a:ext uri="{FF2B5EF4-FFF2-40B4-BE49-F238E27FC236}">
+                <a16:creationId xmlns:a16="http://schemas.microsoft.com/office/drawing/2014/main" id="{B8FDD0E3-4EC8-4FB4-AAC5-E9C047C9329F}"/>
+              </a:ext>
+            </a:extLst>
+          </p:cNvPr>
+          <p:cNvGraphicFramePr>
+            <a:graphicFrameLocks noGrp="1"/>
+          </p:cNvGraphicFramePr>
+          <p:nvPr>
+            <p:extLst>
+              <p:ext uri="{D42A27DB-BD31-4B8C-83A1-F6EECF244321}">
+                <p14:modId xmlns:p14="http://schemas.microsoft.com/office/powerpoint/2010/main" val="1032831007"/>
+              </p:ext>
+            </p:extLst>
+          </p:nvPr>
+        </p:nvGraphicFramePr>
+        <p:xfrm>
+          <a:off x="1806546" y="18480402"/>
+          <a:ext cx="4442840" cy="1030064"/>
+        </p:xfrm>
+        <a:graphic>
+          <a:graphicData uri="http://schemas.openxmlformats.org/drawingml/2006/table">
+            <a:tbl>
+              <a:tblPr firstRow="1" bandRow="1">
+                <a:tableStyleId>{69CF1AB2-1976-4502-BF36-3FF5EA218861}</a:tableStyleId>
+              </a:tblPr>
+              <a:tblGrid>
+                <a:gridCol w="3395090">
+                  <a:extLst>
+                    <a:ext uri="{9D8B030D-6E8A-4147-A177-3AD203B41FA5}">
+                      <a16:colId xmlns:a16="http://schemas.microsoft.com/office/drawing/2014/main" val="3814208030"/>
+                    </a:ext>
+                  </a:extLst>
+                </a:gridCol>
+                <a:gridCol w="1047750">
+                  <a:extLst>
+                    <a:ext uri="{9D8B030D-6E8A-4147-A177-3AD203B41FA5}">
+                      <a16:colId xmlns:a16="http://schemas.microsoft.com/office/drawing/2014/main" val="1546040442"/>
+                    </a:ext>
+                  </a:extLst>
+                </a:gridCol>
+              </a:tblGrid>
+              <a:tr h="515032">
+                <a:tc>
+                  <a:txBody>
+                    <a:bodyPr/>
+                    <a:lstStyle/>
+                    <a:p>
+                      <a:pPr algn="l"/>
+                      <a:r>
+                        <a:rPr lang="en-US" sz="1100" b="0" dirty="0">
+                          <a:solidFill>
+                            <a:sysClr val="windowText" lastClr="000000"/>
+                          </a:solidFill>
+                        </a:rPr>
+                        <a:t>Number of 1-hr periods outside manufacture-listed temperature target criteria</a:t>
+                      </a:r>
+                    </a:p>
+                  </a:txBody>
+                  <a:tcPr marL="45720" marR="45720" anchor="ctr">
+                    <a:lnL w="12700" cap="flat" cmpd="sng" algn="ctr">
+                      <a:solidFill>
+                        <a:schemeClr val="bg1"/>
+                      </a:solidFill>
+                      <a:prstDash val="solid"/>
+                      <a:round/>
+                      <a:headEnd type="none" w="med" len="med"/>
+                      <a:tailEnd type="none" w="med" len="med"/>
+                    </a:lnL>
+                    <a:lnR w="12700" cap="flat" cmpd="sng" algn="ctr">
+                      <a:solidFill>
+                        <a:schemeClr val="bg1"/>
+                      </a:solidFill>
+                      <a:prstDash val="solid"/>
+                      <a:round/>
+                      <a:headEnd type="none" w="med" len="med"/>
+                      <a:tailEnd type="none" w="med" len="med"/>
+                    </a:lnR>
+                    <a:lnT w="12700" cap="flat" cmpd="sng" algn="ctr">
+                      <a:solidFill>
+                        <a:schemeClr val="bg1"/>
+                      </a:solidFill>
+                      <a:prstDash val="solid"/>
+                      <a:round/>
+                      <a:headEnd type="none" w="med" len="med"/>
+                      <a:tailEnd type="none" w="med" len="med"/>
+                    </a:lnT>
+                    <a:lnB w="12700" cap="flat" cmpd="sng" algn="ctr">
+                      <a:solidFill>
+                        <a:schemeClr val="bg1"/>
+                      </a:solidFill>
+                      <a:prstDash val="solid"/>
+                      <a:round/>
+                      <a:headEnd type="none" w="med" len="med"/>
+                      <a:tailEnd type="none" w="med" len="med"/>
+                    </a:lnB>
+                    <a:lnTlToBr w="12700" cmpd="sng">
+                      <a:noFill/>
+                      <a:prstDash val="solid"/>
+                    </a:lnTlToBr>
+                    <a:lnBlToTr w="12700" cmpd="sng">
+                      <a:noFill/>
+                      <a:prstDash val="solid"/>
+                    </a:lnBlToTr>
+                    <a:solidFill>
+                      <a:srgbClr val="BFD0EB"/>
+                    </a:solidFill>
+                  </a:tcPr>
+                </a:tc>
+                <a:tc>
+                  <a:txBody>
+                    <a:bodyPr/>
+                    <a:lstStyle/>
+                    <a:p>
+                      <a:pPr algn="ctr"/>
+                      <a:endParaRPr lang="en-US" sz="1400" dirty="0">
+                        <a:solidFill>
+                          <a:sysClr val="windowText" lastClr="000000"/>
+                        </a:solidFill>
+                        <a:latin typeface="+mn-lt"/>
+                      </a:endParaRPr>
+                    </a:p>
+                  </a:txBody>
+                  <a:tcPr marL="45720" marR="45720" anchor="ctr">
+                    <a:lnL w="12700" cap="flat" cmpd="sng" algn="ctr">
+                      <a:solidFill>
+                        <a:schemeClr val="bg1"/>
+                      </a:solidFill>
+                      <a:prstDash val="solid"/>
+                      <a:round/>
+                      <a:headEnd type="none" w="med" len="med"/>
+                      <a:tailEnd type="none" w="med" len="med"/>
+                    </a:lnL>
+                    <a:lnR w="12700" cap="flat" cmpd="sng" algn="ctr">
+                      <a:solidFill>
+                        <a:schemeClr val="bg1"/>
+                      </a:solidFill>
+                      <a:prstDash val="solid"/>
+                      <a:round/>
+                      <a:headEnd type="none" w="med" len="med"/>
+                      <a:tailEnd type="none" w="med" len="med"/>
+                    </a:lnR>
+                    <a:lnT w="12700" cap="flat" cmpd="sng" algn="ctr">
+                      <a:solidFill>
+                        <a:schemeClr val="bg1"/>
+                      </a:solidFill>
+                      <a:prstDash val="solid"/>
+                      <a:round/>
+                      <a:headEnd type="none" w="med" len="med"/>
+                      <a:tailEnd type="none" w="med" len="med"/>
+                    </a:lnT>
+                    <a:lnB w="12700" cap="flat" cmpd="sng" algn="ctr">
+                      <a:solidFill>
+                        <a:schemeClr val="bg1"/>
+                      </a:solidFill>
+                      <a:prstDash val="solid"/>
+                      <a:round/>
+                      <a:headEnd type="none" w="med" len="med"/>
+                      <a:tailEnd type="none" w="med" len="med"/>
+                    </a:lnB>
+                    <a:lnTlToBr w="12700" cmpd="sng">
+                      <a:noFill/>
+                      <a:prstDash val="solid"/>
+                    </a:lnTlToBr>
+                    <a:lnBlToTr w="12700" cmpd="sng">
+                      <a:noFill/>
+                      <a:prstDash val="solid"/>
+                    </a:lnBlToTr>
+                    <a:solidFill>
+                      <a:srgbClr val="E8EEF8"/>
+                    </a:solidFill>
+                  </a:tcPr>
+                </a:tc>
+                <a:extLst>
+                  <a:ext uri="{0D108BD9-81ED-4DB2-BD59-A6C34878D82A}">
+                    <a16:rowId xmlns:a16="http://schemas.microsoft.com/office/drawing/2014/main" val="1499110780"/>
+                  </a:ext>
+                </a:extLst>
+              </a:tr>
+              <a:tr h="515032">
+                <a:tc>
+                  <a:txBody>
+                    <a:bodyPr/>
+                    <a:lstStyle/>
+                    <a:p>
+                      <a:pPr marL="0" marR="0" lvl="0" indent="0" algn="l" defTabSz="1554480" rtl="0" eaLnBrk="1" fontAlgn="auto" latinLnBrk="0" hangingPunct="1">
+                        <a:lnSpc>
+                          <a:spcPct val="100000"/>
+                        </a:lnSpc>
+                        <a:spcBef>
+                          <a:spcPts val="0"/>
+                        </a:spcBef>
+                        <a:spcAft>
+                          <a:spcPts val="0"/>
+                        </a:spcAft>
+                        <a:buClrTx/>
+                        <a:buSzTx/>
+                        <a:buFontTx/>
+                        <a:buNone/>
+                        <a:tabLst/>
+                        <a:defRPr/>
+                      </a:pPr>
+                      <a:r>
+                        <a:rPr lang="en-US" sz="1100" b="0" dirty="0">
+                          <a:solidFill>
+                            <a:sysClr val="windowText" lastClr="000000"/>
+                          </a:solidFill>
+                        </a:rPr>
+                        <a:t>Number of 1-hr periods outside manufacture-listed relative humidity target criteria</a:t>
+                      </a:r>
+                    </a:p>
+                  </a:txBody>
+                  <a:tcPr marL="45720" marR="45720" anchor="ctr">
+                    <a:lnL w="12700" cap="flat" cmpd="sng" algn="ctr">
+                      <a:solidFill>
+                        <a:schemeClr val="bg1"/>
+                      </a:solidFill>
+                      <a:prstDash val="solid"/>
+                      <a:round/>
+                      <a:headEnd type="none" w="med" len="med"/>
+                      <a:tailEnd type="none" w="med" len="med"/>
+                    </a:lnL>
+                    <a:lnR w="12700" cap="flat" cmpd="sng" algn="ctr">
+                      <a:solidFill>
+                        <a:schemeClr val="bg1"/>
+                      </a:solidFill>
+                      <a:prstDash val="solid"/>
+                      <a:round/>
+                      <a:headEnd type="none" w="med" len="med"/>
+                      <a:tailEnd type="none" w="med" len="med"/>
+                    </a:lnR>
+                    <a:lnT w="12700" cap="flat" cmpd="sng" algn="ctr">
+                      <a:solidFill>
+                        <a:schemeClr val="bg1"/>
+                      </a:solidFill>
+                      <a:prstDash val="solid"/>
+                      <a:round/>
+                      <a:headEnd type="none" w="med" len="med"/>
+                      <a:tailEnd type="none" w="med" len="med"/>
+                    </a:lnT>
+                    <a:lnB w="12700" cap="flat" cmpd="sng" algn="ctr">
+                      <a:solidFill>
+                        <a:schemeClr val="bg1"/>
+                      </a:solidFill>
+                      <a:prstDash val="solid"/>
+                      <a:round/>
+                      <a:headEnd type="none" w="med" len="med"/>
+                      <a:tailEnd type="none" w="med" len="med"/>
+                    </a:lnB>
+                    <a:lnTlToBr w="12700" cmpd="sng">
+                      <a:noFill/>
+                      <a:prstDash val="solid"/>
+                    </a:lnTlToBr>
+                    <a:lnBlToTr w="12700" cmpd="sng">
+                      <a:noFill/>
+                      <a:prstDash val="solid"/>
+                    </a:lnBlToTr>
+                    <a:solidFill>
+                      <a:srgbClr val="BFD0EB"/>
+                    </a:solidFill>
+                  </a:tcPr>
+                </a:tc>
+                <a:tc>
+                  <a:txBody>
+                    <a:bodyPr/>
+                    <a:lstStyle/>
+                    <a:p>
+                      <a:pPr algn="ctr"/>
+                      <a:endParaRPr lang="en-US" sz="1400" dirty="0">
+                        <a:solidFill>
+                          <a:sysClr val="windowText" lastClr="000000"/>
+                        </a:solidFill>
+                        <a:latin typeface="+mn-lt"/>
+                      </a:endParaRPr>
+                    </a:p>
+                  </a:txBody>
+                  <a:tcPr marL="45720" marR="45720" anchor="ctr">
+                    <a:lnL w="12700" cap="flat" cmpd="sng" algn="ctr">
+                      <a:solidFill>
+                        <a:schemeClr val="bg1"/>
+                      </a:solidFill>
+                      <a:prstDash val="solid"/>
+                      <a:round/>
+                      <a:headEnd type="none" w="med" len="med"/>
+                      <a:tailEnd type="none" w="med" len="med"/>
+                    </a:lnL>
+                    <a:lnR w="12700" cap="flat" cmpd="sng" algn="ctr">
+                      <a:solidFill>
+                        <a:schemeClr val="bg1"/>
+                      </a:solidFill>
+                      <a:prstDash val="solid"/>
+                      <a:round/>
+                      <a:headEnd type="none" w="med" len="med"/>
+                      <a:tailEnd type="none" w="med" len="med"/>
+                    </a:lnR>
+                    <a:lnT w="12700" cap="flat" cmpd="sng" algn="ctr">
+                      <a:solidFill>
+                        <a:schemeClr val="bg1"/>
+                      </a:solidFill>
+                      <a:prstDash val="solid"/>
+                      <a:round/>
+                      <a:headEnd type="none" w="med" len="med"/>
+                      <a:tailEnd type="none" w="med" len="med"/>
+                    </a:lnT>
+                    <a:lnB w="12700" cap="flat" cmpd="sng" algn="ctr">
+                      <a:solidFill>
+                        <a:schemeClr val="bg1"/>
+                      </a:solidFill>
+                      <a:prstDash val="solid"/>
+                      <a:round/>
+                      <a:headEnd type="none" w="med" len="med"/>
+                      <a:tailEnd type="none" w="med" len="med"/>
+                    </a:lnB>
+                    <a:lnTlToBr w="12700" cmpd="sng">
+                      <a:noFill/>
+                      <a:prstDash val="solid"/>
+                    </a:lnTlToBr>
+                    <a:lnBlToTr w="12700" cmpd="sng">
+                      <a:noFill/>
+                      <a:prstDash val="solid"/>
+                    </a:lnBlToTr>
+                    <a:solidFill>
+                      <a:srgbClr val="E8EEF8"/>
+                    </a:solidFill>
+                  </a:tcPr>
+                </a:tc>
+                <a:extLst>
+                  <a:ext uri="{0D108BD9-81ED-4DB2-BD59-A6C34878D82A}">
+                    <a16:rowId xmlns:a16="http://schemas.microsoft.com/office/drawing/2014/main" val="337105121"/>
+                  </a:ext>
+                </a:extLst>
+              </a:tr>
+            </a:tbl>
+          </a:graphicData>
+        </a:graphic>
+      </p:graphicFrame>
+      <p:graphicFrame>
+        <p:nvGraphicFramePr>
+          <p:cNvPr id="33" name="Table 18">
+            <a:extLst>
+              <a:ext uri="{FF2B5EF4-FFF2-40B4-BE49-F238E27FC236}">
+                <a16:creationId xmlns:a16="http://schemas.microsoft.com/office/drawing/2014/main" id="{FF6CC21A-1E4F-4F2B-8F5A-10BA08714989}"/>
+              </a:ext>
+            </a:extLst>
+          </p:cNvPr>
+          <p:cNvGraphicFramePr>
+            <a:graphicFrameLocks noGrp="1"/>
+          </p:cNvGraphicFramePr>
+          <p:nvPr>
+            <p:extLst>
+              <p:ext uri="{D42A27DB-BD31-4B8C-83A1-F6EECF244321}">
+                <p14:modId xmlns:p14="http://schemas.microsoft.com/office/powerpoint/2010/main" val="2900966569"/>
+              </p:ext>
+            </p:extLst>
+          </p:nvPr>
+        </p:nvGraphicFramePr>
+        <p:xfrm>
+          <a:off x="7905366" y="18480402"/>
+          <a:ext cx="4292660" cy="1030064"/>
+        </p:xfrm>
+        <a:graphic>
+          <a:graphicData uri="http://schemas.openxmlformats.org/drawingml/2006/table">
+            <a:tbl>
+              <a:tblPr firstRow="1" bandRow="1">
+                <a:tableStyleId>{69CF1AB2-1976-4502-BF36-3FF5EA218861}</a:tableStyleId>
+              </a:tblPr>
+              <a:tblGrid>
+                <a:gridCol w="3191504">
+                  <a:extLst>
+                    <a:ext uri="{9D8B030D-6E8A-4147-A177-3AD203B41FA5}">
+                      <a16:colId xmlns:a16="http://schemas.microsoft.com/office/drawing/2014/main" val="3814208030"/>
+                    </a:ext>
+                  </a:extLst>
+                </a:gridCol>
+                <a:gridCol w="1101156">
+                  <a:extLst>
+                    <a:ext uri="{9D8B030D-6E8A-4147-A177-3AD203B41FA5}">
+                      <a16:colId xmlns:a16="http://schemas.microsoft.com/office/drawing/2014/main" val="1546040442"/>
+                    </a:ext>
+                  </a:extLst>
+                </a:gridCol>
+              </a:tblGrid>
+              <a:tr h="515032">
+                <a:tc>
+                  <a:txBody>
+                    <a:bodyPr/>
+                    <a:lstStyle/>
+                    <a:p>
+                      <a:pPr algn="l"/>
+                      <a:r>
+                        <a:rPr lang="en-US" sz="1100" b="0" dirty="0">
+                          <a:solidFill>
+                            <a:sysClr val="windowText" lastClr="000000"/>
+                          </a:solidFill>
+                        </a:rPr>
+                        <a:t>Mean number of paired, normalized concentration and temperature values</a:t>
+                      </a:r>
+                    </a:p>
+                  </a:txBody>
+                  <a:tcPr marL="45720" marR="45720" anchor="ctr">
+                    <a:lnL w="12700" cap="flat" cmpd="sng" algn="ctr">
+                      <a:solidFill>
+                        <a:schemeClr val="bg1"/>
+                      </a:solidFill>
+                      <a:prstDash val="solid"/>
+                      <a:round/>
+                      <a:headEnd type="none" w="med" len="med"/>
+                      <a:tailEnd type="none" w="med" len="med"/>
+                    </a:lnL>
+                    <a:lnR w="12700" cap="flat" cmpd="sng" algn="ctr">
+                      <a:solidFill>
+                        <a:schemeClr val="bg1"/>
+                      </a:solidFill>
+                      <a:prstDash val="solid"/>
+                      <a:round/>
+                      <a:headEnd type="none" w="med" len="med"/>
+                      <a:tailEnd type="none" w="med" len="med"/>
+                    </a:lnR>
+                    <a:lnT w="12700" cap="flat" cmpd="sng" algn="ctr">
+                      <a:solidFill>
+                        <a:schemeClr val="bg1"/>
+                      </a:solidFill>
+                      <a:prstDash val="solid"/>
+                      <a:round/>
+                      <a:headEnd type="none" w="med" len="med"/>
+                      <a:tailEnd type="none" w="med" len="med"/>
+                    </a:lnT>
+                    <a:lnB w="12700" cap="flat" cmpd="sng" algn="ctr">
+                      <a:solidFill>
+                        <a:schemeClr val="bg1"/>
+                      </a:solidFill>
+                      <a:prstDash val="solid"/>
+                      <a:round/>
+                      <a:headEnd type="none" w="med" len="med"/>
+                      <a:tailEnd type="none" w="med" len="med"/>
+                    </a:lnB>
+                    <a:lnTlToBr w="12700" cmpd="sng">
+                      <a:noFill/>
+                      <a:prstDash val="solid"/>
+                    </a:lnTlToBr>
+                    <a:lnBlToTr w="12700" cmpd="sng">
+                      <a:noFill/>
+                      <a:prstDash val="solid"/>
+                    </a:lnBlToTr>
+                    <a:solidFill>
+                      <a:srgbClr val="BFD0EB"/>
+                    </a:solidFill>
+                  </a:tcPr>
+                </a:tc>
+                <a:tc>
+                  <a:txBody>
+                    <a:bodyPr/>
+                    <a:lstStyle/>
+                    <a:p>
+                      <a:pPr algn="ctr"/>
+                      <a:endParaRPr lang="en-US" sz="1400" dirty="0">
+                        <a:solidFill>
+                          <a:sysClr val="windowText" lastClr="000000"/>
+                        </a:solidFill>
+                        <a:latin typeface="+mn-lt"/>
+                      </a:endParaRPr>
+                    </a:p>
+                  </a:txBody>
+                  <a:tcPr marL="45720" marR="45720" anchor="ctr">
+                    <a:lnL w="12700" cap="flat" cmpd="sng" algn="ctr">
+                      <a:solidFill>
+                        <a:schemeClr val="bg1"/>
+                      </a:solidFill>
+                      <a:prstDash val="solid"/>
+                      <a:round/>
+                      <a:headEnd type="none" w="med" len="med"/>
+                      <a:tailEnd type="none" w="med" len="med"/>
+                    </a:lnL>
+                    <a:lnR w="12700" cap="flat" cmpd="sng" algn="ctr">
+                      <a:solidFill>
+                        <a:schemeClr val="bg1"/>
+                      </a:solidFill>
+                      <a:prstDash val="solid"/>
+                      <a:round/>
+                      <a:headEnd type="none" w="med" len="med"/>
+                      <a:tailEnd type="none" w="med" len="med"/>
+                    </a:lnR>
+                    <a:lnT w="12700" cap="flat" cmpd="sng" algn="ctr">
+                      <a:solidFill>
+                        <a:schemeClr val="bg1"/>
+                      </a:solidFill>
+                      <a:prstDash val="solid"/>
+                      <a:round/>
+                      <a:headEnd type="none" w="med" len="med"/>
+                      <a:tailEnd type="none" w="med" len="med"/>
+                    </a:lnT>
+                    <a:lnB w="12700" cap="flat" cmpd="sng" algn="ctr">
+                      <a:solidFill>
+                        <a:schemeClr val="bg1"/>
+                      </a:solidFill>
+                      <a:prstDash val="solid"/>
+                      <a:round/>
+                      <a:headEnd type="none" w="med" len="med"/>
+                      <a:tailEnd type="none" w="med" len="med"/>
+                    </a:lnB>
+                    <a:lnTlToBr w="12700" cmpd="sng">
+                      <a:noFill/>
+                      <a:prstDash val="solid"/>
+                    </a:lnTlToBr>
+                    <a:lnBlToTr w="12700" cmpd="sng">
+                      <a:noFill/>
+                      <a:prstDash val="solid"/>
+                    </a:lnBlToTr>
+                    <a:solidFill>
+                      <a:srgbClr val="E8EEF8"/>
+                    </a:solidFill>
+                  </a:tcPr>
+                </a:tc>
+                <a:extLst>
+                  <a:ext uri="{0D108BD9-81ED-4DB2-BD59-A6C34878D82A}">
+                    <a16:rowId xmlns:a16="http://schemas.microsoft.com/office/drawing/2014/main" val="1499110780"/>
+                  </a:ext>
+                </a:extLst>
+              </a:tr>
+              <a:tr h="515032">
+                <a:tc>
+                  <a:txBody>
+                    <a:bodyPr/>
+                    <a:lstStyle/>
+                    <a:p>
+                      <a:pPr marL="0" marR="0" lvl="0" indent="0" algn="l" defTabSz="1554480" rtl="0" eaLnBrk="1" fontAlgn="auto" latinLnBrk="0" hangingPunct="1">
+                        <a:lnSpc>
+                          <a:spcPct val="100000"/>
+                        </a:lnSpc>
+                        <a:spcBef>
+                          <a:spcPts val="0"/>
+                        </a:spcBef>
+                        <a:spcAft>
+                          <a:spcPts val="0"/>
+                        </a:spcAft>
+                        <a:buClrTx/>
+                        <a:buSzTx/>
+                        <a:buFontTx/>
+                        <a:buNone/>
+                        <a:tabLst/>
+                        <a:defRPr/>
+                      </a:pPr>
+                      <a:r>
+                        <a:rPr lang="en-US" sz="1100" b="0" dirty="0">
+                          <a:solidFill>
+                            <a:sysClr val="windowText" lastClr="000000"/>
+                          </a:solidFill>
+                        </a:rPr>
+                        <a:t>Mean number of paired, normalized concentration and relative humidity values</a:t>
+                      </a:r>
+                    </a:p>
+                  </a:txBody>
+                  <a:tcPr marL="45720" marR="45720" anchor="ctr">
+                    <a:lnL w="12700" cap="flat" cmpd="sng" algn="ctr">
+                      <a:solidFill>
+                        <a:schemeClr val="bg1"/>
+                      </a:solidFill>
+                      <a:prstDash val="solid"/>
+                      <a:round/>
+                      <a:headEnd type="none" w="med" len="med"/>
+                      <a:tailEnd type="none" w="med" len="med"/>
+                    </a:lnL>
+                    <a:lnR w="12700" cap="flat" cmpd="sng" algn="ctr">
+                      <a:solidFill>
+                        <a:schemeClr val="bg1"/>
+                      </a:solidFill>
+                      <a:prstDash val="solid"/>
+                      <a:round/>
+                      <a:headEnd type="none" w="med" len="med"/>
+                      <a:tailEnd type="none" w="med" len="med"/>
+                    </a:lnR>
+                    <a:lnT w="12700" cap="flat" cmpd="sng" algn="ctr">
+                      <a:solidFill>
+                        <a:schemeClr val="bg1"/>
+                      </a:solidFill>
+                      <a:prstDash val="solid"/>
+                      <a:round/>
+                      <a:headEnd type="none" w="med" len="med"/>
+                      <a:tailEnd type="none" w="med" len="med"/>
+                    </a:lnT>
+                    <a:lnB w="12700" cap="flat" cmpd="sng" algn="ctr">
+                      <a:solidFill>
+                        <a:schemeClr val="bg1"/>
+                      </a:solidFill>
+                      <a:prstDash val="solid"/>
+                      <a:round/>
+                      <a:headEnd type="none" w="med" len="med"/>
+                      <a:tailEnd type="none" w="med" len="med"/>
+                    </a:lnB>
+                    <a:lnTlToBr w="12700" cmpd="sng">
+                      <a:noFill/>
+                      <a:prstDash val="solid"/>
+                    </a:lnTlToBr>
+                    <a:lnBlToTr w="12700" cmpd="sng">
+                      <a:noFill/>
+                      <a:prstDash val="solid"/>
+                    </a:lnBlToTr>
+                    <a:solidFill>
+                      <a:srgbClr val="BFD0EB"/>
+                    </a:solidFill>
+                  </a:tcPr>
+                </a:tc>
+                <a:tc>
+                  <a:txBody>
+                    <a:bodyPr/>
+                    <a:lstStyle/>
+                    <a:p>
+                      <a:pPr algn="ctr"/>
+                      <a:endParaRPr lang="en-US" sz="1400" dirty="0">
+                        <a:solidFill>
+                          <a:sysClr val="windowText" lastClr="000000"/>
+                        </a:solidFill>
+                        <a:latin typeface="+mn-lt"/>
+                      </a:endParaRPr>
+                    </a:p>
+                  </a:txBody>
+                  <a:tcPr marL="45720" marR="45720" anchor="ctr">
+                    <a:lnL w="12700" cap="flat" cmpd="sng" algn="ctr">
+                      <a:solidFill>
+                        <a:schemeClr val="bg1"/>
+                      </a:solidFill>
+                      <a:prstDash val="solid"/>
+                      <a:round/>
+                      <a:headEnd type="none" w="med" len="med"/>
+                      <a:tailEnd type="none" w="med" len="med"/>
+                    </a:lnL>
+                    <a:lnR w="12700" cap="flat" cmpd="sng" algn="ctr">
+                      <a:solidFill>
+                        <a:schemeClr val="bg1"/>
+                      </a:solidFill>
+                      <a:prstDash val="solid"/>
+                      <a:round/>
+                      <a:headEnd type="none" w="med" len="med"/>
+                      <a:tailEnd type="none" w="med" len="med"/>
+                    </a:lnR>
+                    <a:lnT w="12700" cap="flat" cmpd="sng" algn="ctr">
+                      <a:solidFill>
+                        <a:schemeClr val="bg1"/>
+                      </a:solidFill>
+                      <a:prstDash val="solid"/>
+                      <a:round/>
+                      <a:headEnd type="none" w="med" len="med"/>
+                      <a:tailEnd type="none" w="med" len="med"/>
+                    </a:lnT>
+                    <a:lnB w="12700" cap="flat" cmpd="sng" algn="ctr">
+                      <a:solidFill>
+                        <a:schemeClr val="bg1"/>
+                      </a:solidFill>
+                      <a:prstDash val="solid"/>
+                      <a:round/>
+                      <a:headEnd type="none" w="med" len="med"/>
+                      <a:tailEnd type="none" w="med" len="med"/>
+                    </a:lnB>
+                    <a:lnTlToBr w="12700" cmpd="sng">
+                      <a:noFill/>
+                      <a:prstDash val="solid"/>
+                    </a:lnTlToBr>
+                    <a:lnBlToTr w="12700" cmpd="sng">
+                      <a:noFill/>
+                      <a:prstDash val="solid"/>
+                    </a:lnBlToTr>
+                    <a:solidFill>
+                      <a:srgbClr val="E8EEF8"/>
+                    </a:solidFill>
+                  </a:tcPr>
+                </a:tc>
+                <a:extLst>
+                  <a:ext uri="{0D108BD9-81ED-4DB2-BD59-A6C34878D82A}">
+                    <a16:rowId xmlns:a16="http://schemas.microsoft.com/office/drawing/2014/main" val="337105121"/>
+                  </a:ext>
+                </a:extLst>
+              </a:tr>
+            </a:tbl>
+          </a:graphicData>
+        </a:graphic>
+      </p:graphicFrame>
+      <p:sp>
+        <p:nvSpPr>
+          <p:cNvPr id="34" name="TextBox 33">
+            <a:extLst>
+              <a:ext uri="{FF2B5EF4-FFF2-40B4-BE49-F238E27FC236}">
+                <a16:creationId xmlns:a16="http://schemas.microsoft.com/office/drawing/2014/main" id="{7D655D40-6DF2-4B90-8D9E-8C2B333DA162}"/>
+              </a:ext>
+            </a:extLst>
+          </p:cNvPr>
+          <p:cNvSpPr txBox="1"/>
+          <p:nvPr/>
+        </p:nvSpPr>
+        <p:spPr>
+          <a:xfrm>
+            <a:off x="10051696" y="15476354"/>
+            <a:ext cx="2496575" cy="366254"/>
+          </a:xfrm>
+          <a:prstGeom prst="rect">
+            <a:avLst/>
+          </a:prstGeom>
+          <a:solidFill>
+            <a:schemeClr val="bg1"/>
+          </a:solidFill>
+        </p:spPr>
+        <p:txBody>
+          <a:bodyPr wrap="square" rtlCol="0">
+            <a:spAutoFit/>
+          </a:bodyPr>
+          <a:lstStyle/>
+          <a:p>
+            <a:pPr algn="ctr"/>
+            <a:r>
+              <a:rPr lang="en-US" sz="1780" dirty="0">
+                <a:latin typeface="+mj-lt"/>
+              </a:rPr>
+              <a:t>Meteorological Influence</a:t>
+            </a:r>
           </a:p>
         </p:txBody>
       </p:sp>
@@ -8509,10 +9016,10 @@
       </p:sp>
       <p:sp>
         <p:nvSpPr>
-          <p:cNvPr id="3" name="Picture Placeholder 2">
+          <p:cNvPr id="4" name="Picture Placeholder 3">
             <a:extLst>
               <a:ext uri="{FF2B5EF4-FFF2-40B4-BE49-F238E27FC236}">
-                <a16:creationId xmlns:a16="http://schemas.microsoft.com/office/drawing/2014/main" id="{4BE0F3C0-76E9-4BB6-BD59-BD00B774211E}"/>
+                <a16:creationId xmlns:a16="http://schemas.microsoft.com/office/drawing/2014/main" id="{6692EA42-EB5D-4422-9089-993AB136B2A6}"/>
               </a:ext>
             </a:extLst>
           </p:cNvPr>
@@ -8527,10 +9034,10 @@
       </p:sp>
       <p:sp>
         <p:nvSpPr>
-          <p:cNvPr id="7" name="Text Placeholder 6">
+          <p:cNvPr id="9" name="Text Placeholder 8">
             <a:extLst>
               <a:ext uri="{FF2B5EF4-FFF2-40B4-BE49-F238E27FC236}">
-                <a16:creationId xmlns:a16="http://schemas.microsoft.com/office/drawing/2014/main" id="{368CB50A-0C49-471D-870B-C34E5F12DC10}"/>
+                <a16:creationId xmlns:a16="http://schemas.microsoft.com/office/drawing/2014/main" id="{5A97FEA4-A915-4FBD-B17A-D47AA1C1C52F}"/>
               </a:ext>
             </a:extLst>
           </p:cNvPr>
@@ -8546,16 +9053,16 @@
           <a:bodyPr/>
           <a:lstStyle/>
           <a:p>
-            <a:endParaRPr lang="en-US" dirty="0"/>
+            <a:endParaRPr lang="en-US"/>
           </a:p>
         </p:txBody>
       </p:sp>
       <p:sp>
         <p:nvSpPr>
-          <p:cNvPr id="6" name="Text Placeholder 5">
+          <p:cNvPr id="8" name="Text Placeholder 7">
             <a:extLst>
               <a:ext uri="{FF2B5EF4-FFF2-40B4-BE49-F238E27FC236}">
-                <a16:creationId xmlns:a16="http://schemas.microsoft.com/office/drawing/2014/main" id="{1FAC7418-B39F-48F7-A3F0-03D3E3D9F453}"/>
+                <a16:creationId xmlns:a16="http://schemas.microsoft.com/office/drawing/2014/main" id="{64EE5381-67C9-4DEA-ACDB-E9F8D6D7F4BE}"/>
               </a:ext>
             </a:extLst>
           </p:cNvPr>
@@ -8613,7 +9120,7 @@
             </a:pPr>
             <a:r>
               <a:rPr lang="en-US" dirty="0"/>
-              <a:t>Optionally, additional documentation may be attached or linked to digital versions alongside this report. Such documentation may include field reports and observations during the evaluation period, maintenance logs kept on sensors and reference instruments, standard operating procedures, and other documentation relevant to this evaluation report.  </a:t>
+              <a:t>Additional documentation may be attached or linked to digital versions alongside this report. Such documentation may include field reports and observations during the testing period, maintenance logs for sensors and FRM/FEM monitors, standard operating procedures, and other documentation relevant to this testing report (see below for examples).</a:t>
             </a:r>
           </a:p>
           <a:p>
@@ -8715,10 +9222,10 @@
       </p:cxnSp>
       <p:graphicFrame>
         <p:nvGraphicFramePr>
-          <p:cNvPr id="12" name="Table 11">
+          <p:cNvPr id="15" name="Table 14">
             <a:extLst>
               <a:ext uri="{FF2B5EF4-FFF2-40B4-BE49-F238E27FC236}">
-                <a16:creationId xmlns:a16="http://schemas.microsoft.com/office/drawing/2014/main" id="{D41C8C22-744A-414D-A6F3-9BDC3E39EEDF}"/>
+                <a16:creationId xmlns:a16="http://schemas.microsoft.com/office/drawing/2014/main" id="{FBCA8259-4FB6-42FD-AB91-6E8235005AB8}"/>
               </a:ext>
             </a:extLst>
           </p:cNvPr>
@@ -8728,14 +9235,14 @@
           <p:nvPr>
             <p:extLst>
               <p:ext uri="{D42A27DB-BD31-4B8C-83A1-F6EECF244321}">
-                <p14:modId xmlns:p14="http://schemas.microsoft.com/office/powerpoint/2010/main" val="250969704"/>
+                <p14:modId xmlns:p14="http://schemas.microsoft.com/office/powerpoint/2010/main" val="2450581943"/>
               </p:ext>
             </p:extLst>
           </p:nvPr>
         </p:nvGraphicFramePr>
         <p:xfrm>
           <a:off x="1710150" y="4772325"/>
-          <a:ext cx="12124499" cy="6446362"/>
+          <a:ext cx="12124499" cy="8125116"/>
         </p:xfrm>
         <a:graphic>
           <a:graphicData uri="http://schemas.openxmlformats.org/drawingml/2006/table">
@@ -8986,7 +9493,7 @@
                       <a:pPr algn="ctr"/>
                       <a:r>
                         <a:rPr lang="en-US" sz="1500" dirty="0"/>
-                        <a:t>Field Observations</a:t>
+                        <a:t>Field observations</a:t>
                       </a:r>
                     </a:p>
                   </a:txBody>
@@ -9200,7 +9707,7 @@
                       <a:pPr algn="ctr"/>
                       <a:r>
                         <a:rPr lang="en-US" sz="1500" dirty="0"/>
-                        <a:t>Maintenance Logs</a:t>
+                        <a:t>Maintenance logs</a:t>
                       </a:r>
                     </a:p>
                   </a:txBody>
@@ -9416,7 +9923,7 @@
                       <a:pPr algn="ctr"/>
                       <a:r>
                         <a:rPr lang="en-US" sz="1500" dirty="0"/>
-                        <a:t>Standard Operating Procedure</a:t>
+                        <a:t>Standard operating procedure(s)</a:t>
                       </a:r>
                     </a:p>
                   </a:txBody>
@@ -9632,7 +10139,7 @@
                       <a:pPr algn="ctr"/>
                       <a:r>
                         <a:rPr lang="en-US" sz="1500" dirty="0"/>
-                        <a:t>Photos from Evaluation</a:t>
+                        <a:t>Photos of equipment setup and testing</a:t>
                       </a:r>
                     </a:p>
                   </a:txBody>
@@ -9832,7 +10339,7 @@
                       <a:pPr algn="ctr"/>
                       <a:r>
                         <a:rPr lang="en-US" sz="1500" dirty="0"/>
-                        <a:t>Product Specifications Sheet</a:t>
+                        <a:t>Product specifications sheet(s)</a:t>
                       </a:r>
                     </a:p>
                   </a:txBody>
@@ -10048,7 +10555,7 @@
                       <a:pPr algn="ctr"/>
                       <a:r>
                         <a:rPr lang="en-US" sz="1500" dirty="0"/>
-                        <a:t>Product Manual</a:t>
+                        <a:t>Product manual(s)</a:t>
                       </a:r>
                     </a:p>
                   </a:txBody>
@@ -10264,7 +10771,7 @@
                       <a:pPr algn="ctr"/>
                       <a:r>
                         <a:rPr lang="en-US" sz="1500" dirty="0"/>
-                        <a:t>Deployment Issues</a:t>
+                        <a:t>Deployment issues</a:t>
                       </a:r>
                     </a:p>
                   </a:txBody>
@@ -10467,7 +10974,7 @@
                 </a:tc>
                 <a:extLst>
                   <a:ext uri="{0D108BD9-81ED-4DB2-BD59-A6C34878D82A}">
-                    <a16:rowId xmlns:a16="http://schemas.microsoft.com/office/drawing/2014/main" val="2894317425"/>
+                    <a16:rowId xmlns:a16="http://schemas.microsoft.com/office/drawing/2014/main" val="3114783889"/>
                   </a:ext>
                 </a:extLst>
               </a:tr>
@@ -10480,7 +10987,7 @@
                       <a:pPr algn="ctr"/>
                       <a:r>
                         <a:rPr lang="en-US" sz="1500" dirty="0"/>
-                        <a:t>Data storage, transmission method narrative</a:t>
+                        <a:t>Data storage and transmission method</a:t>
                       </a:r>
                     </a:p>
                   </a:txBody>
@@ -10683,7 +11190,7 @@
                 </a:tc>
                 <a:extLst>
                   <a:ext uri="{0D108BD9-81ED-4DB2-BD59-A6C34878D82A}">
-                    <a16:rowId xmlns:a16="http://schemas.microsoft.com/office/drawing/2014/main" val="1161567411"/>
+                    <a16:rowId xmlns:a16="http://schemas.microsoft.com/office/drawing/2014/main" val="2894317425"/>
                   </a:ext>
                 </a:extLst>
               </a:tr>
@@ -10696,7 +11203,7 @@
                       <a:pPr algn="ctr"/>
                       <a:r>
                         <a:rPr lang="en-US" sz="1500" dirty="0"/>
-                        <a:t>Data correction method narrative</a:t>
+                        <a:t>Data correction approach</a:t>
                       </a:r>
                     </a:p>
                   </a:txBody>
@@ -10899,7 +11406,7 @@
                 </a:tc>
                 <a:extLst>
                   <a:ext uri="{0D108BD9-81ED-4DB2-BD59-A6C34878D82A}">
-                    <a16:rowId xmlns:a16="http://schemas.microsoft.com/office/drawing/2014/main" val="346080301"/>
+                    <a16:rowId xmlns:a16="http://schemas.microsoft.com/office/drawing/2014/main" val="1161567411"/>
                   </a:ext>
                 </a:extLst>
               </a:tr>
@@ -10912,7 +11419,7 @@
                       <a:pPr algn="ctr"/>
                       <a:r>
                         <a:rPr lang="en-US" sz="1500" dirty="0"/>
-                        <a:t>Air Monitoring Station QAPP</a:t>
+                        <a:t>Data analysis/correction scripts and version</a:t>
                       </a:r>
                     </a:p>
                   </a:txBody>
@@ -10983,7 +11490,7 @@
                         <a:defRPr/>
                       </a:pPr>
                       <a:r>
-                        <a:rPr lang="en-US" sz="2000">
+                        <a:rPr lang="en-US" sz="2000" dirty="0">
                           <a:solidFill>
                             <a:schemeClr val="tx1"/>
                           </a:solidFill>
@@ -10991,7 +11498,7 @@
                         </a:rPr>
                         <a:t></a:t>
                       </a:r>
-                      <a:endParaRPr lang="en-US" sz="2000">
+                      <a:endParaRPr lang="en-US" sz="2000" dirty="0">
                         <a:solidFill>
                           <a:schemeClr val="tx1"/>
                         </a:solidFill>
@@ -11115,7 +11622,439 @@
                 </a:tc>
                 <a:extLst>
                   <a:ext uri="{0D108BD9-81ED-4DB2-BD59-A6C34878D82A}">
+                    <a16:rowId xmlns:a16="http://schemas.microsoft.com/office/drawing/2014/main" val="346080301"/>
+                  </a:ext>
+                </a:extLst>
+              </a:tr>
+              <a:tr h="512967">
+                <a:tc>
+                  <a:txBody>
+                    <a:bodyPr/>
+                    <a:lstStyle/>
+                    <a:p>
+                      <a:pPr algn="ctr"/>
+                      <a:r>
+                        <a:rPr lang="en-US" sz="1500" dirty="0"/>
+                        <a:t>Air Monitoring Station QAPP</a:t>
+                      </a:r>
+                    </a:p>
+                  </a:txBody>
+                  <a:tcPr marL="201168" marR="201168" marT="100584" marB="100584" anchor="ctr">
+                    <a:lnL w="12700" cmpd="sng">
+                      <a:noFill/>
+                    </a:lnL>
+                    <a:lnR w="19050" cap="flat" cmpd="sng" algn="ctr">
+                      <a:solidFill>
+                        <a:schemeClr val="bg1"/>
+                      </a:solidFill>
+                      <a:prstDash val="solid"/>
+                      <a:round/>
+                      <a:headEnd type="none" w="med" len="med"/>
+                      <a:tailEnd type="none" w="med" len="med"/>
+                    </a:lnR>
+                    <a:lnT w="19050" cap="flat" cmpd="sng" algn="ctr">
+                      <a:solidFill>
+                        <a:schemeClr val="bg1"/>
+                      </a:solidFill>
+                      <a:prstDash val="solid"/>
+                      <a:round/>
+                      <a:headEnd type="none" w="med" len="med"/>
+                      <a:tailEnd type="none" w="med" len="med"/>
+                    </a:lnT>
+                    <a:lnB w="19050" cap="flat" cmpd="sng" algn="ctr">
+                      <a:solidFill>
+                        <a:schemeClr val="bg1"/>
+                      </a:solidFill>
+                      <a:prstDash val="solid"/>
+                      <a:round/>
+                      <a:headEnd type="none" w="med" len="med"/>
+                      <a:tailEnd type="none" w="med" len="med"/>
+                    </a:lnB>
+                    <a:lnTlToBr w="12700" cmpd="sng">
+                      <a:noFill/>
+                      <a:prstDash val="solid"/>
+                    </a:lnTlToBr>
+                    <a:lnBlToTr w="12700" cmpd="sng">
+                      <a:noFill/>
+                      <a:prstDash val="solid"/>
+                    </a:lnBlToTr>
+                    <a:solidFill>
+                      <a:srgbClr val="BFD0EB"/>
+                    </a:solidFill>
+                  </a:tcPr>
+                </a:tc>
+                <a:tc>
+                  <a:txBody>
+                    <a:bodyPr/>
+                    <a:lstStyle/>
+                    <a:p>
+                      <a:pPr marL="0" marR="0" lvl="0" indent="0" algn="ctr" defTabSz="1554480" rtl="0" eaLnBrk="1" fontAlgn="b" latinLnBrk="0" hangingPunct="1">
+                        <a:lnSpc>
+                          <a:spcPct val="100000"/>
+                        </a:lnSpc>
+                        <a:spcBef>
+                          <a:spcPts val="0"/>
+                        </a:spcBef>
+                        <a:spcAft>
+                          <a:spcPts val="0"/>
+                        </a:spcAft>
+                        <a:buClrTx/>
+                        <a:buSzTx/>
+                        <a:buFontTx/>
+                        <a:buNone/>
+                        <a:tabLst/>
+                        <a:defRPr/>
+                      </a:pPr>
+                      <a:r>
+                        <a:rPr lang="en-US" sz="2000" dirty="0">
+                          <a:solidFill>
+                            <a:schemeClr val="tx1"/>
+                          </a:solidFill>
+                          <a:sym typeface="Wingdings" panose="05000000000000000000" pitchFamily="2" charset="2"/>
+                        </a:rPr>
+                        <a:t></a:t>
+                      </a:r>
+                      <a:endParaRPr lang="en-US" sz="2000" dirty="0">
+                        <a:solidFill>
+                          <a:schemeClr val="tx1"/>
+                        </a:solidFill>
+                      </a:endParaRPr>
+                    </a:p>
+                  </a:txBody>
+                  <a:tcPr marL="16764" marR="16764" marT="16764" marB="0" anchor="ctr">
+                    <a:lnL w="19050" cap="flat" cmpd="sng" algn="ctr">
+                      <a:solidFill>
+                        <a:schemeClr val="bg1"/>
+                      </a:solidFill>
+                      <a:prstDash val="solid"/>
+                      <a:round/>
+                      <a:headEnd type="none" w="med" len="med"/>
+                      <a:tailEnd type="none" w="med" len="med"/>
+                    </a:lnL>
+                    <a:lnR w="19050" cap="flat" cmpd="sng" algn="ctr">
+                      <a:solidFill>
+                        <a:schemeClr val="bg1"/>
+                      </a:solidFill>
+                      <a:prstDash val="solid"/>
+                      <a:round/>
+                      <a:headEnd type="none" w="med" len="med"/>
+                      <a:tailEnd type="none" w="med" len="med"/>
+                    </a:lnR>
+                    <a:lnT w="19050" cap="flat" cmpd="sng" algn="ctr">
+                      <a:solidFill>
+                        <a:schemeClr val="bg1"/>
+                      </a:solidFill>
+                      <a:prstDash val="solid"/>
+                      <a:round/>
+                      <a:headEnd type="none" w="med" len="med"/>
+                      <a:tailEnd type="none" w="med" len="med"/>
+                    </a:lnT>
+                    <a:lnB w="19050" cap="flat" cmpd="sng" algn="ctr">
+                      <a:solidFill>
+                        <a:schemeClr val="bg1"/>
+                      </a:solidFill>
+                      <a:prstDash val="solid"/>
+                      <a:round/>
+                      <a:headEnd type="none" w="med" len="med"/>
+                      <a:tailEnd type="none" w="med" len="med"/>
+                    </a:lnB>
+                    <a:lnTlToBr w="12700" cmpd="sng">
+                      <a:noFill/>
+                      <a:prstDash val="solid"/>
+                    </a:lnTlToBr>
+                    <a:lnBlToTr w="12700" cmpd="sng">
+                      <a:noFill/>
+                      <a:prstDash val="solid"/>
+                    </a:lnBlToTr>
+                    <a:solidFill>
+                      <a:srgbClr val="E8EEF8"/>
+                    </a:solidFill>
+                  </a:tcPr>
+                </a:tc>
+                <a:tc>
+                  <a:txBody>
+                    <a:bodyPr/>
+                    <a:lstStyle/>
+                    <a:p>
+                      <a:pPr algn="ctr" fontAlgn="b"/>
+                      <a:endParaRPr lang="en-US" sz="1500" b="0" i="0" u="none" strike="noStrike" dirty="0">
+                        <a:solidFill>
+                          <a:srgbClr val="000000"/>
+                        </a:solidFill>
+                        <a:effectLst/>
+                        <a:latin typeface="Calibri" panose="020F0502020204030204" pitchFamily="34" charset="0"/>
+                      </a:endParaRPr>
+                    </a:p>
+                  </a:txBody>
+                  <a:tcPr marL="16764" marR="16764" marT="16764" marB="0" anchor="ctr">
+                    <a:lnL w="19050" cap="flat" cmpd="sng" algn="ctr">
+                      <a:solidFill>
+                        <a:schemeClr val="bg1"/>
+                      </a:solidFill>
+                      <a:prstDash val="solid"/>
+                      <a:round/>
+                      <a:headEnd type="none" w="med" len="med"/>
+                      <a:tailEnd type="none" w="med" len="med"/>
+                    </a:lnL>
+                    <a:lnR w="19050" cap="flat" cmpd="sng" algn="ctr">
+                      <a:solidFill>
+                        <a:schemeClr val="bg1"/>
+                      </a:solidFill>
+                      <a:prstDash val="solid"/>
+                      <a:round/>
+                      <a:headEnd type="none" w="med" len="med"/>
+                      <a:tailEnd type="none" w="med" len="med"/>
+                    </a:lnR>
+                    <a:lnT w="19050" cap="flat" cmpd="sng" algn="ctr">
+                      <a:solidFill>
+                        <a:schemeClr val="bg1"/>
+                      </a:solidFill>
+                      <a:prstDash val="solid"/>
+                      <a:round/>
+                      <a:headEnd type="none" w="med" len="med"/>
+                      <a:tailEnd type="none" w="med" len="med"/>
+                    </a:lnT>
+                    <a:lnB w="19050" cap="flat" cmpd="sng" algn="ctr">
+                      <a:solidFill>
+                        <a:schemeClr val="bg1"/>
+                      </a:solidFill>
+                      <a:prstDash val="solid"/>
+                      <a:round/>
+                      <a:headEnd type="none" w="med" len="med"/>
+                      <a:tailEnd type="none" w="med" len="med"/>
+                    </a:lnB>
+                    <a:lnTlToBr w="12700" cmpd="sng">
+                      <a:noFill/>
+                      <a:prstDash val="solid"/>
+                    </a:lnTlToBr>
+                    <a:lnBlToTr w="12700" cmpd="sng">
+                      <a:noFill/>
+                      <a:prstDash val="solid"/>
+                    </a:lnBlToTr>
+                    <a:solidFill>
+                      <a:srgbClr val="E8EEF8"/>
+                    </a:solidFill>
+                  </a:tcPr>
+                </a:tc>
+                <a:extLst>
+                  <a:ext uri="{0D108BD9-81ED-4DB2-BD59-A6C34878D82A}">
                     <a16:rowId xmlns:a16="http://schemas.microsoft.com/office/drawing/2014/main" val="4035565705"/>
+                  </a:ext>
+                </a:extLst>
+              </a:tr>
+              <a:tr h="512967">
+                <a:tc>
+                  <a:txBody>
+                    <a:bodyPr/>
+                    <a:lstStyle/>
+                    <a:p>
+                      <a:pPr algn="ctr"/>
+                      <a:r>
+                        <a:rPr lang="en-US" sz="1500" dirty="0"/>
+                        <a:t>Summary of FRM/FEM monitor QC checks</a:t>
+                      </a:r>
+                    </a:p>
+                  </a:txBody>
+                  <a:tcPr marL="201168" marR="201168" marT="100584" marB="100584" anchor="ctr">
+                    <a:lnL w="12700" cmpd="sng">
+                      <a:noFill/>
+                    </a:lnL>
+                    <a:lnR w="19050" cap="flat" cmpd="sng" algn="ctr">
+                      <a:solidFill>
+                        <a:schemeClr val="bg1"/>
+                      </a:solidFill>
+                      <a:prstDash val="solid"/>
+                      <a:round/>
+                      <a:headEnd type="none" w="med" len="med"/>
+                      <a:tailEnd type="none" w="med" len="med"/>
+                    </a:lnR>
+                    <a:lnT w="19050" cap="flat" cmpd="sng" algn="ctr">
+                      <a:solidFill>
+                        <a:schemeClr val="bg1"/>
+                      </a:solidFill>
+                      <a:prstDash val="solid"/>
+                      <a:round/>
+                      <a:headEnd type="none" w="med" len="med"/>
+                      <a:tailEnd type="none" w="med" len="med"/>
+                    </a:lnT>
+                    <a:lnB w="19050" cap="flat" cmpd="sng" algn="ctr">
+                      <a:solidFill>
+                        <a:schemeClr val="bg1"/>
+                      </a:solidFill>
+                      <a:prstDash val="solid"/>
+                      <a:round/>
+                      <a:headEnd type="none" w="med" len="med"/>
+                      <a:tailEnd type="none" w="med" len="med"/>
+                    </a:lnB>
+                    <a:lnTlToBr w="12700" cmpd="sng">
+                      <a:noFill/>
+                      <a:prstDash val="solid"/>
+                    </a:lnTlToBr>
+                    <a:lnBlToTr w="12700" cmpd="sng">
+                      <a:noFill/>
+                      <a:prstDash val="solid"/>
+                    </a:lnBlToTr>
+                    <a:solidFill>
+                      <a:srgbClr val="BFD0EB"/>
+                    </a:solidFill>
+                  </a:tcPr>
+                </a:tc>
+                <a:tc>
+                  <a:txBody>
+                    <a:bodyPr/>
+                    <a:lstStyle/>
+                    <a:p>
+                      <a:pPr marL="0" marR="0" lvl="0" indent="0" algn="ctr" defTabSz="1554480" rtl="0" eaLnBrk="1" fontAlgn="b" latinLnBrk="0" hangingPunct="1">
+                        <a:lnSpc>
+                          <a:spcPct val="100000"/>
+                        </a:lnSpc>
+                        <a:spcBef>
+                          <a:spcPts val="0"/>
+                        </a:spcBef>
+                        <a:spcAft>
+                          <a:spcPts val="0"/>
+                        </a:spcAft>
+                        <a:buClrTx/>
+                        <a:buSzTx/>
+                        <a:buFontTx/>
+                        <a:buNone/>
+                        <a:tabLst/>
+                        <a:defRPr/>
+                      </a:pPr>
+                      <a:r>
+                        <a:rPr lang="en-US" sz="2000" dirty="0">
+                          <a:solidFill>
+                            <a:schemeClr val="tx1"/>
+                          </a:solidFill>
+                          <a:sym typeface="Wingdings" panose="05000000000000000000" pitchFamily="2" charset="2"/>
+                        </a:rPr>
+                        <a:t></a:t>
+                      </a:r>
+                      <a:endParaRPr lang="en-US" sz="2000" dirty="0">
+                        <a:solidFill>
+                          <a:schemeClr val="tx1"/>
+                        </a:solidFill>
+                      </a:endParaRPr>
+                    </a:p>
+                  </a:txBody>
+                  <a:tcPr marL="16764" marR="16764" marT="16764" marB="0" anchor="ctr">
+                    <a:lnL w="19050" cap="flat" cmpd="sng" algn="ctr">
+                      <a:solidFill>
+                        <a:schemeClr val="bg1"/>
+                      </a:solidFill>
+                      <a:prstDash val="solid"/>
+                      <a:round/>
+                      <a:headEnd type="none" w="med" len="med"/>
+                      <a:tailEnd type="none" w="med" len="med"/>
+                    </a:lnL>
+                    <a:lnR w="19050" cap="flat" cmpd="sng" algn="ctr">
+                      <a:solidFill>
+                        <a:schemeClr val="bg1"/>
+                      </a:solidFill>
+                      <a:prstDash val="solid"/>
+                      <a:round/>
+                      <a:headEnd type="none" w="med" len="med"/>
+                      <a:tailEnd type="none" w="med" len="med"/>
+                    </a:lnR>
+                    <a:lnT w="19050" cap="flat" cmpd="sng" algn="ctr">
+                      <a:solidFill>
+                        <a:schemeClr val="bg1"/>
+                      </a:solidFill>
+                      <a:prstDash val="solid"/>
+                      <a:round/>
+                      <a:headEnd type="none" w="med" len="med"/>
+                      <a:tailEnd type="none" w="med" len="med"/>
+                    </a:lnT>
+                    <a:lnB w="19050" cap="flat" cmpd="sng" algn="ctr">
+                      <a:solidFill>
+                        <a:schemeClr val="bg1"/>
+                      </a:solidFill>
+                      <a:prstDash val="solid"/>
+                      <a:round/>
+                      <a:headEnd type="none" w="med" len="med"/>
+                      <a:tailEnd type="none" w="med" len="med"/>
+                    </a:lnB>
+                    <a:lnTlToBr w="12700" cmpd="sng">
+                      <a:noFill/>
+                      <a:prstDash val="solid"/>
+                    </a:lnTlToBr>
+                    <a:lnBlToTr w="12700" cmpd="sng">
+                      <a:noFill/>
+                      <a:prstDash val="solid"/>
+                    </a:lnBlToTr>
+                    <a:solidFill>
+                      <a:srgbClr val="E8EEF8"/>
+                    </a:solidFill>
+                  </a:tcPr>
+                </a:tc>
+                <a:tc>
+                  <a:txBody>
+                    <a:bodyPr/>
+                    <a:lstStyle/>
+                    <a:p>
+                      <a:pPr algn="ctr" fontAlgn="b"/>
+                      <a:endParaRPr lang="en-US" sz="1500" b="0" i="0" u="none" strike="noStrike" dirty="0">
+                        <a:solidFill>
+                          <a:srgbClr val="000000"/>
+                        </a:solidFill>
+                        <a:effectLst/>
+                        <a:latin typeface="Calibri" panose="020F0502020204030204" pitchFamily="34" charset="0"/>
+                      </a:endParaRPr>
+                    </a:p>
+                  </a:txBody>
+                  <a:tcPr marL="16764" marR="16764" marT="16764" marB="0" anchor="ctr">
+                    <a:lnL w="19050" cap="flat" cmpd="sng" algn="ctr">
+                      <a:solidFill>
+                        <a:schemeClr val="bg1"/>
+                      </a:solidFill>
+                      <a:prstDash val="solid"/>
+                      <a:round/>
+                      <a:headEnd type="none" w="med" len="med"/>
+                      <a:tailEnd type="none" w="med" len="med"/>
+                    </a:lnL>
+                    <a:lnR w="19050" cap="flat" cmpd="sng" algn="ctr">
+                      <a:solidFill>
+                        <a:schemeClr val="bg1"/>
+                      </a:solidFill>
+                      <a:prstDash val="solid"/>
+                      <a:round/>
+                      <a:headEnd type="none" w="med" len="med"/>
+                      <a:tailEnd type="none" w="med" len="med"/>
+                    </a:lnR>
+                    <a:lnT w="19050" cap="flat" cmpd="sng" algn="ctr">
+                      <a:solidFill>
+                        <a:schemeClr val="bg1"/>
+                      </a:solidFill>
+                      <a:prstDash val="solid"/>
+                      <a:round/>
+                      <a:headEnd type="none" w="med" len="med"/>
+                      <a:tailEnd type="none" w="med" len="med"/>
+                    </a:lnT>
+                    <a:lnB w="19050" cap="flat" cmpd="sng" algn="ctr">
+                      <a:solidFill>
+                        <a:schemeClr val="bg1"/>
+                      </a:solidFill>
+                      <a:prstDash val="solid"/>
+                      <a:round/>
+                      <a:headEnd type="none" w="med" len="med"/>
+                      <a:tailEnd type="none" w="med" len="med"/>
+                    </a:lnB>
+                    <a:lnTlToBr w="12700" cmpd="sng">
+                      <a:noFill/>
+                      <a:prstDash val="solid"/>
+                    </a:lnTlToBr>
+                    <a:lnBlToTr w="12700" cmpd="sng">
+                      <a:noFill/>
+                      <a:prstDash val="solid"/>
+                    </a:lnBlToTr>
+                    <a:solidFill>
+                      <a:srgbClr val="E8EEF8"/>
+                    </a:solidFill>
+                  </a:tcPr>
+                </a:tc>
+                <a:extLst>
+                  <a:ext uri="{0D108BD9-81ED-4DB2-BD59-A6C34878D82A}">
+                    <a16:rowId xmlns:a16="http://schemas.microsoft.com/office/drawing/2014/main" val="1134878883"/>
                   </a:ext>
                 </a:extLst>
               </a:tr>
@@ -11128,7 +12067,7 @@
                       <a:pPr algn="ctr"/>
                       <a:r>
                         <a:rPr lang="en-US" sz="1500" dirty="0"/>
-                        <a:t>Other</a:t>
+                        <a:t>Other documents</a:t>
                       </a:r>
                     </a:p>
                   </a:txBody>
@@ -11920,15 +12859,6 @@
 </file>
 
 <file path=customXml/item1.xml><?xml version="1.0" encoding="utf-8"?>
-<?mso-contentType ?>
-<FormTemplates xmlns="http://schemas.microsoft.com/sharepoint/v3/contenttype/forms">
-  <Display>DocumentLibraryForm</Display>
-  <Edit>DocumentLibraryForm</Edit>
-  <New>DocumentLibraryForm</New>
-</FormTemplates>
-</file>
-
-<file path=customXml/item2.xml><?xml version="1.0" encoding="utf-8"?>
 <p:properties xmlns:p="http://schemas.microsoft.com/office/2006/metadata/properties" xmlns:xsi="http://www.w3.org/2001/XMLSchema-instance" xmlns:pc="http://schemas.microsoft.com/office/infopath/2007/PartnerControls">
   <documentManagement>
     <_Source xmlns="http://schemas.microsoft.com/sharepoint/v3/fields" xsi:nil="true"/>
@@ -11967,7 +12897,21 @@
 </p:properties>
 </file>
 
+<file path=customXml/item2.xml><?xml version="1.0" encoding="utf-8"?>
+<?mso-contentType ?>
+<FormTemplates xmlns="http://schemas.microsoft.com/sharepoint/v3/contenttype/forms">
+  <Display>DocumentLibraryForm</Display>
+  <Edit>DocumentLibraryForm</Edit>
+  <New>DocumentLibraryForm</New>
+</FormTemplates>
+</file>
+
 <file path=customXml/item3.xml><?xml version="1.0" encoding="utf-8"?>
+<?mso-contentType ?>
+<SharedContentType xmlns="Microsoft.SharePoint.Taxonomy.ContentTypeSync" SourceId="29f62856-1543-49d4-a736-4569d363f533" ContentTypeId="0x0101" PreviousValue="false"/>
+</file>
+
+<file path=customXml/item4.xml><?xml version="1.0" encoding="utf-8"?>
 <ct:contentTypeSchema xmlns:ct="http://schemas.microsoft.com/office/2006/metadata/contentType" xmlns:ma="http://schemas.microsoft.com/office/2006/metadata/properties/metaAttributes" ct:_="" ma:_="" ma:contentTypeName="Document" ma:contentTypeID="0x010100564A490502BCE94B94B40D182DF629A7" ma:contentTypeVersion="10" ma:contentTypeDescription="Create a new document." ma:contentTypeScope="" ma:versionID="edc9365ca1982d5cfb353b974c2fd121">
   <xsd:schema xmlns:xsd="http://www.w3.org/2001/XMLSchema" xmlns:xs="http://www.w3.org/2001/XMLSchema" xmlns:p="http://schemas.microsoft.com/office/2006/metadata/properties" xmlns:ns1="http://schemas.microsoft.com/sharepoint/v3" xmlns:ns2="4ffa91fb-a0ff-4ac5-b2db-65c790d184a4" xmlns:ns3="http://schemas.microsoft.com/sharepoint.v3" xmlns:ns4="http://schemas.microsoft.com/sharepoint/v3/fields" xmlns:ns5="92953017-96f5-40cd-8d9e-826506a80b1b" targetNamespace="http://schemas.microsoft.com/office/2006/metadata/properties" ma:root="true" ma:fieldsID="0e17b492b81938533bbafcb3131407c0" ns1:_="" ns2:_="" ns3:_="" ns4:_="" ns5:_="">
     <xsd:import namespace="http://schemas.microsoft.com/sharepoint/v3"/>
@@ -12365,20 +13309,7 @@
 </ct:contentTypeSchema>
 </file>
 
-<file path=customXml/item4.xml><?xml version="1.0" encoding="utf-8"?>
-<?mso-contentType ?>
-<SharedContentType xmlns="Microsoft.SharePoint.Taxonomy.ContentTypeSync" SourceId="29f62856-1543-49d4-a736-4569d363f533" ContentTypeId="0x0101" PreviousValue="false"/>
-</file>
-
 <file path=customXml/itemProps1.xml><?xml version="1.0" encoding="utf-8"?>
-<ds:datastoreItem xmlns:ds="http://schemas.openxmlformats.org/officeDocument/2006/customXml" ds:itemID="{E3A66A80-EEBD-4235-BF6F-659447EA7FC0}">
-  <ds:schemaRefs>
-    <ds:schemaRef ds:uri="http://schemas.microsoft.com/sharepoint/v3/contenttype/forms"/>
-  </ds:schemaRefs>
-</ds:datastoreItem>
-</file>
-
-<file path=customXml/itemProps2.xml><?xml version="1.0" encoding="utf-8"?>
 <ds:datastoreItem xmlns:ds="http://schemas.openxmlformats.org/officeDocument/2006/customXml" ds:itemID="{2EED311A-CCB5-4625-B52F-BB9F85A51581}">
   <ds:schemaRefs>
     <ds:schemaRef ds:uri="http://schemas.microsoft.com/office/2006/metadata/properties"/>
@@ -12391,7 +13322,23 @@
 </ds:datastoreItem>
 </file>
 
+<file path=customXml/itemProps2.xml><?xml version="1.0" encoding="utf-8"?>
+<ds:datastoreItem xmlns:ds="http://schemas.openxmlformats.org/officeDocument/2006/customXml" ds:itemID="{E3A66A80-EEBD-4235-BF6F-659447EA7FC0}">
+  <ds:schemaRefs>
+    <ds:schemaRef ds:uri="http://schemas.microsoft.com/sharepoint/v3/contenttype/forms"/>
+  </ds:schemaRefs>
+</ds:datastoreItem>
+</file>
+
 <file path=customXml/itemProps3.xml><?xml version="1.0" encoding="utf-8"?>
+<ds:datastoreItem xmlns:ds="http://schemas.openxmlformats.org/officeDocument/2006/customXml" ds:itemID="{9D969709-82DA-4F6F-85CB-B966EACA0A33}">
+  <ds:schemaRefs>
+    <ds:schemaRef ds:uri="Microsoft.SharePoint.Taxonomy.ContentTypeSync"/>
+  </ds:schemaRefs>
+</ds:datastoreItem>
+</file>
+
+<file path=customXml/itemProps4.xml><?xml version="1.0" encoding="utf-8"?>
 <ds:datastoreItem xmlns:ds="http://schemas.openxmlformats.org/officeDocument/2006/customXml" ds:itemID="{1DA0D606-E9FB-46FF-A65C-4208D58FBF6D}">
   <ds:schemaRefs>
     <ds:schemaRef ds:uri="http://schemas.microsoft.com/office/2006/metadata/contentType"/>
@@ -12411,12 +13358,4 @@
     <ds:schemaRef ds:uri="http://schemas.microsoft.com/internal/obd"/>
   </ds:schemaRefs>
 </ds:datastoreItem>
-</file>
-
-<file path=customXml/itemProps4.xml><?xml version="1.0" encoding="utf-8"?>
-<ds:datastoreItem xmlns:ds="http://schemas.openxmlformats.org/officeDocument/2006/customXml" ds:itemID="{9D969709-82DA-4F6F-85CB-B966EACA0A33}">
-  <ds:schemaRefs>
-    <ds:schemaRef ds:uri="Microsoft.SharePoint.Taxonomy.ContentTypeSync"/>
-  </ds:schemaRefs>
-</ds:datastoreItem>
 </file>
</xml_diff>